<commit_message>
refactor: atualização do ppt
</commit_message>
<xml_diff>
--- a/ppt-aulas.pptx
+++ b/ppt-aulas.pptx
@@ -28,13 +28,14 @@
     <p:sldId id="279" r:id="rId22"/>
     <p:sldId id="280" r:id="rId23"/>
     <p:sldId id="282" r:id="rId24"/>
-    <p:sldId id="269" r:id="rId25"/>
-    <p:sldId id="270" r:id="rId26"/>
-    <p:sldId id="271" r:id="rId27"/>
-    <p:sldId id="272" r:id="rId28"/>
-    <p:sldId id="281" r:id="rId29"/>
-    <p:sldId id="284" r:id="rId30"/>
-    <p:sldId id="285" r:id="rId31"/>
+    <p:sldId id="281" r:id="rId25"/>
+    <p:sldId id="284" r:id="rId26"/>
+    <p:sldId id="285" r:id="rId27"/>
+    <p:sldId id="286" r:id="rId28"/>
+    <p:sldId id="269" r:id="rId29"/>
+    <p:sldId id="270" r:id="rId30"/>
+    <p:sldId id="271" r:id="rId31"/>
+    <p:sldId id="272" r:id="rId32"/>
   </p:sldIdLst>
   <p:sldSz cx="12192000" cy="6858000"/>
   <p:notesSz cx="6858000" cy="9144000"/>
@@ -272,7 +273,7 @@
           <a:p>
             <a:fld id="{911B5871-3836-449A-B8AC-E5A7B37E7431}" type="datetimeFigureOut">
               <a:rPr lang="pt-BR" smtClean="0"/>
-              <a:t>31/05/2024</a:t>
+              <a:t>04/06/2024</a:t>
             </a:fld>
             <a:endParaRPr lang="pt-BR"/>
           </a:p>
@@ -442,7 +443,7 @@
           <a:p>
             <a:fld id="{911B5871-3836-449A-B8AC-E5A7B37E7431}" type="datetimeFigureOut">
               <a:rPr lang="pt-BR" smtClean="0"/>
-              <a:t>31/05/2024</a:t>
+              <a:t>04/06/2024</a:t>
             </a:fld>
             <a:endParaRPr lang="pt-BR"/>
           </a:p>
@@ -622,7 +623,7 @@
           <a:p>
             <a:fld id="{911B5871-3836-449A-B8AC-E5A7B37E7431}" type="datetimeFigureOut">
               <a:rPr lang="pt-BR" smtClean="0"/>
-              <a:t>31/05/2024</a:t>
+              <a:t>04/06/2024</a:t>
             </a:fld>
             <a:endParaRPr lang="pt-BR"/>
           </a:p>
@@ -792,7 +793,7 @@
           <a:p>
             <a:fld id="{911B5871-3836-449A-B8AC-E5A7B37E7431}" type="datetimeFigureOut">
               <a:rPr lang="pt-BR" smtClean="0"/>
-              <a:t>31/05/2024</a:t>
+              <a:t>04/06/2024</a:t>
             </a:fld>
             <a:endParaRPr lang="pt-BR"/>
           </a:p>
@@ -1038,7 +1039,7 @@
           <a:p>
             <a:fld id="{911B5871-3836-449A-B8AC-E5A7B37E7431}" type="datetimeFigureOut">
               <a:rPr lang="pt-BR" smtClean="0"/>
-              <a:t>31/05/2024</a:t>
+              <a:t>04/06/2024</a:t>
             </a:fld>
             <a:endParaRPr lang="pt-BR"/>
           </a:p>
@@ -1270,7 +1271,7 @@
           <a:p>
             <a:fld id="{911B5871-3836-449A-B8AC-E5A7B37E7431}" type="datetimeFigureOut">
               <a:rPr lang="pt-BR" smtClean="0"/>
-              <a:t>31/05/2024</a:t>
+              <a:t>04/06/2024</a:t>
             </a:fld>
             <a:endParaRPr lang="pt-BR"/>
           </a:p>
@@ -1637,7 +1638,7 @@
           <a:p>
             <a:fld id="{911B5871-3836-449A-B8AC-E5A7B37E7431}" type="datetimeFigureOut">
               <a:rPr lang="pt-BR" smtClean="0"/>
-              <a:t>31/05/2024</a:t>
+              <a:t>04/06/2024</a:t>
             </a:fld>
             <a:endParaRPr lang="pt-BR"/>
           </a:p>
@@ -1755,7 +1756,7 @@
           <a:p>
             <a:fld id="{911B5871-3836-449A-B8AC-E5A7B37E7431}" type="datetimeFigureOut">
               <a:rPr lang="pt-BR" smtClean="0"/>
-              <a:t>31/05/2024</a:t>
+              <a:t>04/06/2024</a:t>
             </a:fld>
             <a:endParaRPr lang="pt-BR"/>
           </a:p>
@@ -1850,7 +1851,7 @@
           <a:p>
             <a:fld id="{911B5871-3836-449A-B8AC-E5A7B37E7431}" type="datetimeFigureOut">
               <a:rPr lang="pt-BR" smtClean="0"/>
-              <a:t>31/05/2024</a:t>
+              <a:t>04/06/2024</a:t>
             </a:fld>
             <a:endParaRPr lang="pt-BR"/>
           </a:p>
@@ -2127,7 +2128,7 @@
           <a:p>
             <a:fld id="{911B5871-3836-449A-B8AC-E5A7B37E7431}" type="datetimeFigureOut">
               <a:rPr lang="pt-BR" smtClean="0"/>
-              <a:t>31/05/2024</a:t>
+              <a:t>04/06/2024</a:t>
             </a:fld>
             <a:endParaRPr lang="pt-BR"/>
           </a:p>
@@ -2384,7 +2385,7 @@
           <a:p>
             <a:fld id="{911B5871-3836-449A-B8AC-E5A7B37E7431}" type="datetimeFigureOut">
               <a:rPr lang="pt-BR" smtClean="0"/>
-              <a:t>31/05/2024</a:t>
+              <a:t>04/06/2024</a:t>
             </a:fld>
             <a:endParaRPr lang="pt-BR"/>
           </a:p>
@@ -2597,7 +2598,7 @@
           <a:p>
             <a:fld id="{911B5871-3836-449A-B8AC-E5A7B37E7431}" type="datetimeFigureOut">
               <a:rPr lang="pt-BR" smtClean="0"/>
-              <a:t>31/05/2024</a:t>
+              <a:t>04/06/2024</a:t>
             </a:fld>
             <a:endParaRPr lang="pt-BR"/>
           </a:p>
@@ -3608,9 +3609,6 @@
               </a:rPr>
               <a:t>não pode alterar diretamente valores com estado.</a:t>
             </a:r>
-            <a:endParaRPr lang="pt-BR" dirty="0">
-              <a:latin typeface="Altone Variable" pitchFamily="2" charset="0"/>
-            </a:endParaRPr>
           </a:p>
         </p:txBody>
       </p:sp>
@@ -4613,6 +4611,13 @@
   <p:clrMapOvr>
     <a:masterClrMapping/>
   </p:clrMapOvr>
+  <p:timing>
+    <p:tnLst>
+      <p:par>
+        <p:cTn id="1" dur="indefinite" restart="never" nodeType="tmRoot"/>
+      </p:par>
+    </p:tnLst>
+  </p:timing>
 </p:sld>
 </file>
 
@@ -4824,6 +4829,13 @@
   <p:clrMapOvr>
     <a:masterClrMapping/>
   </p:clrMapOvr>
+  <p:timing>
+    <p:tnLst>
+      <p:par>
+        <p:cTn id="1" dur="indefinite" restart="never" nodeType="tmRoot"/>
+      </p:par>
+    </p:tnLst>
+  </p:timing>
 </p:sld>
 </file>
 
@@ -4923,6 +4935,13 @@
   <p:clrMapOvr>
     <a:masterClrMapping/>
   </p:clrMapOvr>
+  <p:timing>
+    <p:tnLst>
+      <p:par>
+        <p:cTn id="1" dur="indefinite" restart="never" nodeType="tmRoot"/>
+      </p:par>
+    </p:tnLst>
+  </p:timing>
 </p:sld>
 </file>
 
@@ -5336,6 +5355,13 @@
   <p:clrMapOvr>
     <a:masterClrMapping/>
   </p:clrMapOvr>
+  <p:timing>
+    <p:tnLst>
+      <p:par>
+        <p:cTn id="1" dur="indefinite" restart="never" nodeType="tmRoot"/>
+      </p:par>
+    </p:tnLst>
+  </p:timing>
 </p:sld>
 </file>
 
@@ -5558,6 +5584,13 @@
   <p:clrMapOvr>
     <a:masterClrMapping/>
   </p:clrMapOvr>
+  <p:timing>
+    <p:tnLst>
+      <p:par>
+        <p:cTn id="1" dur="indefinite" restart="never" nodeType="tmRoot"/>
+      </p:par>
+    </p:tnLst>
+  </p:timing>
 </p:sld>
 </file>
 
@@ -5657,6 +5690,13 @@
   <p:clrMapOvr>
     <a:masterClrMapping/>
   </p:clrMapOvr>
+  <p:timing>
+    <p:tnLst>
+      <p:par>
+        <p:cTn id="1" dur="indefinite" restart="never" nodeType="tmRoot"/>
+      </p:par>
+    </p:tnLst>
+  </p:timing>
 </p:sld>
 </file>
 
@@ -5861,9 +5901,6 @@
               </a:rPr>
               <a:t>pai com componentes filhos.</a:t>
             </a:r>
-            <a:endParaRPr lang="pt-BR" dirty="0">
-              <a:latin typeface="Altone Variable" pitchFamily="2" charset="0"/>
-            </a:endParaRPr>
           </a:p>
         </p:txBody>
       </p:sp>
@@ -5877,10 +5914,847 @@
   <p:clrMapOvr>
     <a:masterClrMapping/>
   </p:clrMapOvr>
+  <p:timing>
+    <p:tnLst>
+      <p:par>
+        <p:cTn id="1" dur="indefinite" restart="never" nodeType="tmRoot"/>
+      </p:par>
+    </p:tnLst>
+  </p:timing>
 </p:sld>
 </file>
 
 <file path=ppt/slides/slide24.xml><?xml version="1.0" encoding="utf-8"?>
+<p:sld xmlns:a="http://schemas.openxmlformats.org/drawingml/2006/main" xmlns:r="http://schemas.openxmlformats.org/officeDocument/2006/relationships" xmlns:p="http://schemas.openxmlformats.org/presentationml/2006/main">
+  <p:cSld>
+    <p:spTree>
+      <p:nvGrpSpPr>
+        <p:cNvPr id="1" name=""/>
+        <p:cNvGrpSpPr/>
+        <p:nvPr/>
+      </p:nvGrpSpPr>
+      <p:grpSpPr>
+        <a:xfrm>
+          <a:off x="0" y="0"/>
+          <a:ext cx="0" cy="0"/>
+          <a:chOff x="0" y="0"/>
+          <a:chExt cx="0" cy="0"/>
+        </a:xfrm>
+      </p:grpSpPr>
+      <p:sp>
+        <p:nvSpPr>
+          <p:cNvPr id="2" name="Título 1"/>
+          <p:cNvSpPr>
+            <a:spLocks noGrp="1"/>
+          </p:cNvSpPr>
+          <p:nvPr>
+            <p:ph type="title"/>
+          </p:nvPr>
+        </p:nvSpPr>
+        <p:spPr/>
+        <p:txBody>
+          <a:bodyPr/>
+          <a:lstStyle/>
+          <a:p>
+            <a:pPr algn="ctr"/>
+            <a:r>
+              <a:rPr lang="pt-BR" dirty="0" smtClean="0">
+                <a:latin typeface="Altone Variable Semi Bold" pitchFamily="2" charset="0"/>
+              </a:rPr>
+              <a:t>Rotas e Navegação</a:t>
+            </a:r>
+            <a:endParaRPr lang="pt-BR" dirty="0">
+              <a:latin typeface="Altone Variable Semi Bold" pitchFamily="2" charset="0"/>
+            </a:endParaRPr>
+          </a:p>
+        </p:txBody>
+      </p:sp>
+      <p:pic>
+        <p:nvPicPr>
+          <p:cNvPr id="1026" name="Picture 2" descr="Sobre os navios | ONE PIECE FOREVER WORLD [RPG] Amino"/>
+          <p:cNvPicPr>
+            <a:picLocks noChangeAspect="1" noChangeArrowheads="1" noCrop="1"/>
+          </p:cNvPicPr>
+          <p:nvPr/>
+        </p:nvPicPr>
+        <p:blipFill>
+          <a:blip r:embed="rId2">
+            <a:extLst>
+              <a:ext uri="{28A0092B-C50C-407E-A947-70E740481C1C}">
+                <a14:useLocalDpi xmlns:a14="http://schemas.microsoft.com/office/drawing/2010/main" val="0"/>
+              </a:ext>
+            </a:extLst>
+          </a:blip>
+          <a:srcRect/>
+          <a:stretch>
+            <a:fillRect/>
+          </a:stretch>
+        </p:blipFill>
+        <p:spPr bwMode="auto">
+          <a:xfrm>
+            <a:off x="3148576" y="1851233"/>
+            <a:ext cx="5894848" cy="4421136"/>
+          </a:xfrm>
+          <a:prstGeom prst="rect">
+            <a:avLst/>
+          </a:prstGeom>
+          <a:noFill/>
+          <a:extLst>
+            <a:ext uri="{909E8E84-426E-40DD-AFC4-6F175D3DCCD1}">
+              <a14:hiddenFill xmlns:a14="http://schemas.microsoft.com/office/drawing/2010/main">
+                <a:solidFill>
+                  <a:srgbClr val="FFFFFF"/>
+                </a:solidFill>
+              </a14:hiddenFill>
+            </a:ext>
+          </a:extLst>
+        </p:spPr>
+      </p:pic>
+    </p:spTree>
+    <p:extLst>
+      <p:ext uri="{BB962C8B-B14F-4D97-AF65-F5344CB8AC3E}">
+        <p14:creationId xmlns:p14="http://schemas.microsoft.com/office/powerpoint/2010/main" val="2798432597"/>
+      </p:ext>
+    </p:extLst>
+  </p:cSld>
+  <p:clrMapOvr>
+    <a:masterClrMapping/>
+  </p:clrMapOvr>
+  <p:timing>
+    <p:tnLst>
+      <p:par>
+        <p:cTn id="1" dur="indefinite" restart="never" nodeType="tmRoot"/>
+      </p:par>
+    </p:tnLst>
+  </p:timing>
+</p:sld>
+</file>
+
+<file path=ppt/slides/slide25.xml><?xml version="1.0" encoding="utf-8"?>
+<p:sld xmlns:a="http://schemas.openxmlformats.org/drawingml/2006/main" xmlns:r="http://schemas.openxmlformats.org/officeDocument/2006/relationships" xmlns:p="http://schemas.openxmlformats.org/presentationml/2006/main">
+  <p:cSld>
+    <p:spTree>
+      <p:nvGrpSpPr>
+        <p:cNvPr id="1" name=""/>
+        <p:cNvGrpSpPr/>
+        <p:nvPr/>
+      </p:nvGrpSpPr>
+      <p:grpSpPr>
+        <a:xfrm>
+          <a:off x="0" y="0"/>
+          <a:ext cx="0" cy="0"/>
+          <a:chOff x="0" y="0"/>
+          <a:chExt cx="0" cy="0"/>
+        </a:xfrm>
+      </p:grpSpPr>
+      <p:sp>
+        <p:nvSpPr>
+          <p:cNvPr id="2" name="Título 1"/>
+          <p:cNvSpPr>
+            <a:spLocks noGrp="1"/>
+          </p:cNvSpPr>
+          <p:nvPr>
+            <p:ph type="title"/>
+          </p:nvPr>
+        </p:nvSpPr>
+        <p:spPr/>
+        <p:txBody>
+          <a:bodyPr/>
+          <a:lstStyle/>
+          <a:p>
+            <a:pPr algn="ctr"/>
+            <a:r>
+              <a:rPr lang="pt-BR" dirty="0" smtClean="0">
+                <a:latin typeface="Altone Variable Semi Bold" pitchFamily="2" charset="0"/>
+              </a:rPr>
+              <a:t>Rotas</a:t>
+            </a:r>
+            <a:endParaRPr lang="pt-BR" dirty="0">
+              <a:latin typeface="Altone Variable Semi Bold" pitchFamily="2" charset="0"/>
+            </a:endParaRPr>
+          </a:p>
+        </p:txBody>
+      </p:sp>
+      <p:sp>
+        <p:nvSpPr>
+          <p:cNvPr id="3" name="Espaço Reservado para Conteúdo 2"/>
+          <p:cNvSpPr>
+            <a:spLocks noGrp="1"/>
+          </p:cNvSpPr>
+          <p:nvPr>
+            <p:ph idx="1"/>
+          </p:nvPr>
+        </p:nvSpPr>
+        <p:spPr>
+          <a:xfrm>
+            <a:off x="906566" y="2346919"/>
+            <a:ext cx="10220058" cy="3301852"/>
+          </a:xfrm>
+        </p:spPr>
+        <p:txBody>
+          <a:bodyPr>
+            <a:normAutofit/>
+          </a:bodyPr>
+          <a:lstStyle/>
+          <a:p>
+            <a:r>
+              <a:rPr lang="pt-BR" dirty="0">
+                <a:latin typeface="Altone Variable" pitchFamily="2" charset="0"/>
+              </a:rPr>
+              <a:t>Rotas são como páginas internas </a:t>
+            </a:r>
+            <a:r>
+              <a:rPr lang="pt-BR" dirty="0" smtClean="0">
+                <a:latin typeface="Altone Variable" pitchFamily="2" charset="0"/>
+              </a:rPr>
+              <a:t>do site</a:t>
+            </a:r>
+            <a:r>
+              <a:rPr lang="pt-BR" dirty="0">
+                <a:latin typeface="Altone Variable" pitchFamily="2" charset="0"/>
+              </a:rPr>
+              <a:t>. Entretanto, não são </a:t>
+            </a:r>
+            <a:r>
+              <a:rPr lang="pt-BR" dirty="0" smtClean="0">
+                <a:latin typeface="Altone Variable" pitchFamily="2" charset="0"/>
+              </a:rPr>
+              <a:t>acionados endereços </a:t>
+            </a:r>
+            <a:r>
+              <a:rPr lang="pt-BR" dirty="0">
+                <a:latin typeface="Altone Variable" pitchFamily="2" charset="0"/>
+              </a:rPr>
+              <a:t>do servidor, toda </a:t>
+            </a:r>
+            <a:r>
+              <a:rPr lang="pt-BR" dirty="0" smtClean="0">
+                <a:latin typeface="Altone Variable" pitchFamily="2" charset="0"/>
+              </a:rPr>
+              <a:t>a </a:t>
+            </a:r>
+            <a:r>
+              <a:rPr lang="pt-BR" dirty="0" err="1" smtClean="0">
+                <a:latin typeface="Altone Variable" pitchFamily="2" charset="0"/>
+              </a:rPr>
+              <a:t>renderização</a:t>
+            </a:r>
+            <a:r>
+              <a:rPr lang="pt-BR" dirty="0" smtClean="0">
+                <a:latin typeface="Altone Variable" pitchFamily="2" charset="0"/>
+              </a:rPr>
+              <a:t> </a:t>
+            </a:r>
+            <a:r>
+              <a:rPr lang="pt-BR" dirty="0">
+                <a:latin typeface="Altone Variable" pitchFamily="2" charset="0"/>
+              </a:rPr>
+              <a:t>fica no próprio </a:t>
+            </a:r>
+            <a:r>
+              <a:rPr lang="pt-BR" dirty="0" err="1">
+                <a:latin typeface="Altone Variable" pitchFamily="2" charset="0"/>
+              </a:rPr>
+              <a:t>frontend</a:t>
+            </a:r>
+            <a:r>
+              <a:rPr lang="pt-BR" dirty="0" smtClean="0">
+                <a:latin typeface="Altone Variable" pitchFamily="2" charset="0"/>
+              </a:rPr>
+              <a:t>.</a:t>
+            </a:r>
+          </a:p>
+          <a:p>
+            <a:r>
+              <a:rPr lang="pt-BR" dirty="0">
+                <a:latin typeface="Altone Variable" pitchFamily="2" charset="0"/>
+              </a:rPr>
+              <a:t>Graças ao HTML5, o uso do # não </a:t>
+            </a:r>
+            <a:r>
+              <a:rPr lang="pt-BR" dirty="0" smtClean="0">
+                <a:latin typeface="Altone Variable" pitchFamily="2" charset="0"/>
+              </a:rPr>
+              <a:t>é mais </a:t>
+            </a:r>
+            <a:r>
+              <a:rPr lang="pt-BR" dirty="0">
+                <a:latin typeface="Altone Variable" pitchFamily="2" charset="0"/>
+              </a:rPr>
+              <a:t>necessário para acessar </a:t>
+            </a:r>
+            <a:r>
+              <a:rPr lang="pt-BR" dirty="0" smtClean="0">
+                <a:latin typeface="Altone Variable" pitchFamily="2" charset="0"/>
+              </a:rPr>
+              <a:t>âncoras. Com </a:t>
+            </a:r>
+            <a:r>
+              <a:rPr lang="pt-BR" dirty="0">
+                <a:latin typeface="Altone Variable" pitchFamily="2" charset="0"/>
+              </a:rPr>
+              <a:t>isso, o endereço na barra </a:t>
+            </a:r>
+            <a:r>
+              <a:rPr lang="pt-BR" dirty="0" smtClean="0">
+                <a:latin typeface="Altone Variable" pitchFamily="2" charset="0"/>
+              </a:rPr>
+              <a:t>do navegador </a:t>
+            </a:r>
+            <a:r>
+              <a:rPr lang="pt-BR" dirty="0">
+                <a:latin typeface="Altone Variable" pitchFamily="2" charset="0"/>
+              </a:rPr>
+              <a:t>se parece com uma </a:t>
+            </a:r>
+            <a:r>
+              <a:rPr lang="pt-BR" dirty="0" smtClean="0">
+                <a:latin typeface="Altone Variable" pitchFamily="2" charset="0"/>
+              </a:rPr>
+              <a:t>URL normal</a:t>
+            </a:r>
+            <a:r>
+              <a:rPr lang="pt-BR" dirty="0">
+                <a:latin typeface="Altone Variable" pitchFamily="2" charset="0"/>
+              </a:rPr>
+              <a:t>, mas é uma rota </a:t>
+            </a:r>
+            <a:r>
+              <a:rPr lang="pt-BR" dirty="0" smtClean="0">
+                <a:latin typeface="Altone Variable" pitchFamily="2" charset="0"/>
+              </a:rPr>
+              <a:t>interpretada apenas </a:t>
+            </a:r>
+            <a:r>
+              <a:rPr lang="pt-BR" dirty="0">
+                <a:latin typeface="Altone Variable" pitchFamily="2" charset="0"/>
+              </a:rPr>
+              <a:t>no </a:t>
+            </a:r>
+            <a:r>
+              <a:rPr lang="pt-BR" dirty="0" err="1">
+                <a:latin typeface="Altone Variable" pitchFamily="2" charset="0"/>
+              </a:rPr>
+              <a:t>frontend</a:t>
+            </a:r>
+            <a:r>
+              <a:rPr lang="pt-BR" dirty="0">
+                <a:latin typeface="Altone Variable" pitchFamily="2" charset="0"/>
+              </a:rPr>
+              <a:t>.</a:t>
+            </a:r>
+          </a:p>
+        </p:txBody>
+      </p:sp>
+    </p:spTree>
+    <p:extLst>
+      <p:ext uri="{BB962C8B-B14F-4D97-AF65-F5344CB8AC3E}">
+        <p14:creationId xmlns:p14="http://schemas.microsoft.com/office/powerpoint/2010/main" val="1885562912"/>
+      </p:ext>
+    </p:extLst>
+  </p:cSld>
+  <p:clrMapOvr>
+    <a:masterClrMapping/>
+  </p:clrMapOvr>
+  <p:timing>
+    <p:tnLst>
+      <p:par>
+        <p:cTn id="1" dur="indefinite" restart="never" nodeType="tmRoot"/>
+      </p:par>
+    </p:tnLst>
+  </p:timing>
+</p:sld>
+</file>
+
+<file path=ppt/slides/slide26.xml><?xml version="1.0" encoding="utf-8"?>
+<p:sld xmlns:a="http://schemas.openxmlformats.org/drawingml/2006/main" xmlns:r="http://schemas.openxmlformats.org/officeDocument/2006/relationships" xmlns:p="http://schemas.openxmlformats.org/presentationml/2006/main">
+  <p:cSld>
+    <p:spTree>
+      <p:nvGrpSpPr>
+        <p:cNvPr id="1" name=""/>
+        <p:cNvGrpSpPr/>
+        <p:nvPr/>
+      </p:nvGrpSpPr>
+      <p:grpSpPr>
+        <a:xfrm>
+          <a:off x="0" y="0"/>
+          <a:ext cx="0" cy="0"/>
+          <a:chOff x="0" y="0"/>
+          <a:chExt cx="0" cy="0"/>
+        </a:xfrm>
+      </p:grpSpPr>
+      <p:sp>
+        <p:nvSpPr>
+          <p:cNvPr id="2" name="Título 1"/>
+          <p:cNvSpPr>
+            <a:spLocks noGrp="1"/>
+          </p:cNvSpPr>
+          <p:nvPr>
+            <p:ph type="title"/>
+          </p:nvPr>
+        </p:nvSpPr>
+        <p:spPr/>
+        <p:txBody>
+          <a:bodyPr/>
+          <a:lstStyle/>
+          <a:p>
+            <a:pPr algn="ctr"/>
+            <a:r>
+              <a:rPr lang="pt-BR" dirty="0" smtClean="0">
+                <a:latin typeface="Altone Variable Semi Bold" pitchFamily="2" charset="0"/>
+              </a:rPr>
+              <a:t>Instalando o </a:t>
+            </a:r>
+            <a:r>
+              <a:rPr lang="pt-BR" dirty="0" err="1" smtClean="0">
+                <a:latin typeface="Altone Variable Semi Bold" pitchFamily="2" charset="0"/>
+              </a:rPr>
+              <a:t>Router</a:t>
+            </a:r>
+            <a:endParaRPr lang="pt-BR" dirty="0">
+              <a:latin typeface="Altone Variable Semi Bold" pitchFamily="2" charset="0"/>
+            </a:endParaRPr>
+          </a:p>
+        </p:txBody>
+      </p:sp>
+      <p:sp>
+        <p:nvSpPr>
+          <p:cNvPr id="3" name="Espaço Reservado para Conteúdo 2"/>
+          <p:cNvSpPr>
+            <a:spLocks noGrp="1"/>
+          </p:cNvSpPr>
+          <p:nvPr>
+            <p:ph idx="1"/>
+          </p:nvPr>
+        </p:nvSpPr>
+        <p:spPr>
+          <a:xfrm>
+            <a:off x="906566" y="2346919"/>
+            <a:ext cx="10220058" cy="3301852"/>
+          </a:xfrm>
+        </p:spPr>
+        <p:txBody>
+          <a:bodyPr>
+            <a:normAutofit/>
+          </a:bodyPr>
+          <a:lstStyle/>
+          <a:p>
+            <a:r>
+              <a:rPr lang="pt-BR" b="1" dirty="0" err="1">
+                <a:latin typeface="Altone Variable" pitchFamily="2" charset="0"/>
+              </a:rPr>
+              <a:t>npm</a:t>
+            </a:r>
+            <a:r>
+              <a:rPr lang="pt-BR" b="1" dirty="0">
+                <a:latin typeface="Altone Variable" pitchFamily="2" charset="0"/>
+              </a:rPr>
+              <a:t> </a:t>
+            </a:r>
+            <a:r>
+              <a:rPr lang="pt-BR" b="1" dirty="0" err="1">
+                <a:latin typeface="Altone Variable" pitchFamily="2" charset="0"/>
+              </a:rPr>
+              <a:t>install</a:t>
+            </a:r>
+            <a:r>
+              <a:rPr lang="pt-BR" b="1" dirty="0">
+                <a:latin typeface="Altone Variable" pitchFamily="2" charset="0"/>
+              </a:rPr>
+              <a:t> </a:t>
+            </a:r>
+            <a:r>
+              <a:rPr lang="pt-BR" b="1" dirty="0" err="1" smtClean="0">
+                <a:latin typeface="Altone Variable" pitchFamily="2" charset="0"/>
+              </a:rPr>
+              <a:t>react</a:t>
+            </a:r>
+            <a:r>
+              <a:rPr lang="pt-BR" b="1" dirty="0" smtClean="0">
+                <a:latin typeface="Altone Variable" pitchFamily="2" charset="0"/>
+              </a:rPr>
+              <a:t>-</a:t>
+            </a:r>
+            <a:r>
+              <a:rPr lang="pt-BR" b="1" dirty="0" err="1" smtClean="0">
+                <a:latin typeface="Altone Variable" pitchFamily="2" charset="0"/>
+              </a:rPr>
+              <a:t>router</a:t>
+            </a:r>
+            <a:r>
+              <a:rPr lang="pt-BR" b="1" dirty="0" smtClean="0">
+                <a:latin typeface="Altone Variable" pitchFamily="2" charset="0"/>
+              </a:rPr>
+              <a:t>-dom</a:t>
+            </a:r>
+            <a:endParaRPr lang="pt-BR" b="1" dirty="0" smtClean="0">
+              <a:latin typeface="Altone Variable" pitchFamily="2" charset="0"/>
+            </a:endParaRPr>
+          </a:p>
+          <a:p>
+            <a:endParaRPr lang="pt-BR" b="1" dirty="0" smtClean="0">
+              <a:latin typeface="Altone Variable" pitchFamily="2" charset="0"/>
+            </a:endParaRPr>
+          </a:p>
+          <a:p>
+            <a:r>
+              <a:rPr lang="pt-BR" dirty="0" smtClean="0">
+                <a:latin typeface="Altone Variable" pitchFamily="2" charset="0"/>
+              </a:rPr>
+              <a:t>incluir no </a:t>
+            </a:r>
+            <a:r>
+              <a:rPr lang="pt-BR" dirty="0" err="1" smtClean="0">
+                <a:latin typeface="Altone Variable" pitchFamily="2" charset="0"/>
+              </a:rPr>
+              <a:t>main.jsx</a:t>
+            </a:r>
+            <a:r>
+              <a:rPr lang="pt-BR" dirty="0" smtClean="0">
+                <a:latin typeface="Altone Variable" pitchFamily="2" charset="0"/>
+              </a:rPr>
+              <a:t> o container para as páginas. Esse container será criado com o componente </a:t>
+            </a:r>
+            <a:r>
+              <a:rPr lang="pt-BR" b="1" dirty="0" smtClean="0">
+                <a:latin typeface="Altone Variable" pitchFamily="2" charset="0"/>
+              </a:rPr>
+              <a:t>&lt;</a:t>
+            </a:r>
+            <a:r>
+              <a:rPr lang="pt-BR" b="1" dirty="0" err="1" smtClean="0">
+                <a:latin typeface="Altone Variable" pitchFamily="2" charset="0"/>
+              </a:rPr>
+              <a:t>BrowserRouter</a:t>
+            </a:r>
+            <a:r>
+              <a:rPr lang="pt-BR" b="1" dirty="0" smtClean="0">
+                <a:latin typeface="Altone Variable" pitchFamily="2" charset="0"/>
+              </a:rPr>
+              <a:t> /&gt;.</a:t>
+            </a:r>
+          </a:p>
+          <a:p>
+            <a:endParaRPr lang="pt-BR" b="1" dirty="0">
+              <a:latin typeface="Altone Variable" pitchFamily="2" charset="0"/>
+            </a:endParaRPr>
+          </a:p>
+          <a:p>
+            <a:r>
+              <a:rPr lang="pt-BR" dirty="0">
+                <a:latin typeface="Altone Variable" pitchFamily="2" charset="0"/>
+              </a:rPr>
+              <a:t>Precisamos de um roteador, o "de/para" </a:t>
+            </a:r>
+            <a:r>
+              <a:rPr lang="pt-BR" dirty="0" smtClean="0">
+                <a:latin typeface="Altone Variable" pitchFamily="2" charset="0"/>
+              </a:rPr>
+              <a:t>entre o </a:t>
+            </a:r>
+            <a:r>
+              <a:rPr lang="pt-BR" dirty="0">
+                <a:latin typeface="Altone Variable" pitchFamily="2" charset="0"/>
+              </a:rPr>
+              <a:t>caminho e a </a:t>
+            </a:r>
+            <a:r>
+              <a:rPr lang="pt-BR" dirty="0" smtClean="0">
+                <a:latin typeface="Altone Variable" pitchFamily="2" charset="0"/>
+              </a:rPr>
+              <a:t>página. Componente </a:t>
+            </a:r>
+            <a:r>
+              <a:rPr lang="pt-BR" dirty="0">
+                <a:latin typeface="Altone Variable" pitchFamily="2" charset="0"/>
+              </a:rPr>
+              <a:t>`&lt;</a:t>
+            </a:r>
+            <a:r>
+              <a:rPr lang="pt-BR" dirty="0" err="1">
+                <a:latin typeface="Altone Variable" pitchFamily="2" charset="0"/>
+              </a:rPr>
+              <a:t>Route</a:t>
+            </a:r>
+            <a:r>
+              <a:rPr lang="pt-BR" dirty="0">
+                <a:latin typeface="Altone Variable" pitchFamily="2" charset="0"/>
+              </a:rPr>
+              <a:t> /&gt;`.</a:t>
+            </a:r>
+          </a:p>
+        </p:txBody>
+      </p:sp>
+    </p:spTree>
+    <p:extLst>
+      <p:ext uri="{BB962C8B-B14F-4D97-AF65-F5344CB8AC3E}">
+        <p14:creationId xmlns:p14="http://schemas.microsoft.com/office/powerpoint/2010/main" val="1470794827"/>
+      </p:ext>
+    </p:extLst>
+  </p:cSld>
+  <p:clrMapOvr>
+    <a:masterClrMapping/>
+  </p:clrMapOvr>
+  <p:timing>
+    <p:tnLst>
+      <p:par>
+        <p:cTn id="1" dur="indefinite" restart="never" nodeType="tmRoot"/>
+      </p:par>
+    </p:tnLst>
+  </p:timing>
+</p:sld>
+</file>
+
+<file path=ppt/slides/slide27.xml><?xml version="1.0" encoding="utf-8"?>
+<p:sld xmlns:a="http://schemas.openxmlformats.org/drawingml/2006/main" xmlns:r="http://schemas.openxmlformats.org/officeDocument/2006/relationships" xmlns:p="http://schemas.openxmlformats.org/presentationml/2006/main">
+  <p:cSld>
+    <p:spTree>
+      <p:nvGrpSpPr>
+        <p:cNvPr id="1" name=""/>
+        <p:cNvGrpSpPr/>
+        <p:nvPr/>
+      </p:nvGrpSpPr>
+      <p:grpSpPr>
+        <a:xfrm>
+          <a:off x="0" y="0"/>
+          <a:ext cx="0" cy="0"/>
+          <a:chOff x="0" y="0"/>
+          <a:chExt cx="0" cy="0"/>
+        </a:xfrm>
+      </p:grpSpPr>
+      <p:sp>
+        <p:nvSpPr>
+          <p:cNvPr id="2" name="Título 1"/>
+          <p:cNvSpPr>
+            <a:spLocks noGrp="1"/>
+          </p:cNvSpPr>
+          <p:nvPr>
+            <p:ph type="title"/>
+          </p:nvPr>
+        </p:nvSpPr>
+        <p:spPr/>
+        <p:txBody>
+          <a:bodyPr/>
+          <a:lstStyle/>
+          <a:p>
+            <a:pPr algn="ctr"/>
+            <a:r>
+              <a:rPr lang="pt-BR" dirty="0" err="1" smtClean="0">
+                <a:latin typeface="Altone Variable Semi Bold" pitchFamily="2" charset="0"/>
+              </a:rPr>
+              <a:t>useNavigate</a:t>
+            </a:r>
+            <a:endParaRPr lang="pt-BR" dirty="0">
+              <a:latin typeface="Altone Variable Semi Bold" pitchFamily="2" charset="0"/>
+            </a:endParaRPr>
+          </a:p>
+        </p:txBody>
+      </p:sp>
+      <p:sp>
+        <p:nvSpPr>
+          <p:cNvPr id="3" name="Espaço Reservado para Conteúdo 2"/>
+          <p:cNvSpPr>
+            <a:spLocks noGrp="1"/>
+          </p:cNvSpPr>
+          <p:nvPr>
+            <p:ph idx="1"/>
+          </p:nvPr>
+        </p:nvSpPr>
+        <p:spPr>
+          <a:xfrm>
+            <a:off x="985971" y="1918551"/>
+            <a:ext cx="10220058" cy="3301852"/>
+          </a:xfrm>
+        </p:spPr>
+        <p:txBody>
+          <a:bodyPr>
+            <a:noAutofit/>
+          </a:bodyPr>
+          <a:lstStyle/>
+          <a:p>
+            <a:r>
+              <a:rPr lang="pt-BR" sz="3200" dirty="0">
+                <a:latin typeface="Altone Variable" pitchFamily="2" charset="0"/>
+              </a:rPr>
+              <a:t>O </a:t>
+            </a:r>
+            <a:r>
+              <a:rPr lang="pt-BR" sz="3200" dirty="0" err="1">
+                <a:latin typeface="Altone Variable" pitchFamily="2" charset="0"/>
+              </a:rPr>
+              <a:t>useNavigate</a:t>
+            </a:r>
+            <a:r>
+              <a:rPr lang="pt-BR" sz="3200" dirty="0">
+                <a:latin typeface="Altone Variable" pitchFamily="2" charset="0"/>
+              </a:rPr>
+              <a:t> é um </a:t>
+            </a:r>
+            <a:r>
+              <a:rPr lang="pt-BR" sz="3200" b="1" dirty="0" err="1">
+                <a:latin typeface="Altone Variable" pitchFamily="2" charset="0"/>
+              </a:rPr>
+              <a:t>hook</a:t>
+            </a:r>
+            <a:r>
+              <a:rPr lang="pt-BR" sz="3200" dirty="0">
+                <a:latin typeface="Altone Variable" pitchFamily="2" charset="0"/>
+              </a:rPr>
+              <a:t> que permite programaticamente mudar a rota dentro </a:t>
+            </a:r>
+            <a:r>
+              <a:rPr lang="pt-BR" sz="3200" dirty="0" smtClean="0">
+                <a:latin typeface="Altone Variable" pitchFamily="2" charset="0"/>
+              </a:rPr>
+              <a:t>da aplicação. </a:t>
+            </a:r>
+            <a:r>
+              <a:rPr lang="pt-BR" sz="3200" dirty="0">
+                <a:latin typeface="Altone Variable" pitchFamily="2" charset="0"/>
+              </a:rPr>
+              <a:t>Este </a:t>
+            </a:r>
+            <a:r>
+              <a:rPr lang="pt-BR" sz="3200" dirty="0" err="1">
+                <a:latin typeface="Altone Variable" pitchFamily="2" charset="0"/>
+              </a:rPr>
+              <a:t>hook</a:t>
+            </a:r>
+            <a:r>
+              <a:rPr lang="pt-BR" sz="3200" dirty="0">
+                <a:latin typeface="Altone Variable" pitchFamily="2" charset="0"/>
+              </a:rPr>
+              <a:t> é parte da API do </a:t>
+            </a:r>
+            <a:r>
+              <a:rPr lang="pt-BR" sz="3200" b="1" dirty="0" err="1">
+                <a:latin typeface="Altone Variable" pitchFamily="2" charset="0"/>
+              </a:rPr>
+              <a:t>react</a:t>
+            </a:r>
+            <a:r>
+              <a:rPr lang="pt-BR" sz="3200" b="1" dirty="0">
+                <a:latin typeface="Altone Variable" pitchFamily="2" charset="0"/>
+              </a:rPr>
+              <a:t>-</a:t>
+            </a:r>
+            <a:r>
+              <a:rPr lang="pt-BR" sz="3200" b="1" dirty="0" err="1">
+                <a:latin typeface="Altone Variable" pitchFamily="2" charset="0"/>
+              </a:rPr>
+              <a:t>router</a:t>
+            </a:r>
+            <a:r>
+              <a:rPr lang="pt-BR" sz="3200" b="1" dirty="0">
+                <a:latin typeface="Altone Variable" pitchFamily="2" charset="0"/>
+              </a:rPr>
+              <a:t>-dom</a:t>
+            </a:r>
+            <a:r>
+              <a:rPr lang="pt-BR" sz="3200" dirty="0">
+                <a:latin typeface="Altone Variable" pitchFamily="2" charset="0"/>
+              </a:rPr>
+              <a:t> versão 6 ou superior</a:t>
+            </a:r>
+            <a:r>
+              <a:rPr lang="pt-BR" sz="3200" dirty="0" smtClean="0">
+                <a:latin typeface="Altone Variable" pitchFamily="2" charset="0"/>
+              </a:rPr>
+              <a:t>.</a:t>
+            </a:r>
+          </a:p>
+          <a:p>
+            <a:endParaRPr lang="pt-BR" sz="3200" dirty="0">
+              <a:latin typeface="Altone Variable" pitchFamily="2" charset="0"/>
+            </a:endParaRPr>
+          </a:p>
+          <a:p>
+            <a:r>
+              <a:rPr lang="pt-BR" sz="3200" dirty="0" smtClean="0">
+                <a:latin typeface="Altone Variable" pitchFamily="2" charset="0"/>
+              </a:rPr>
+              <a:t>Sintaxe:</a:t>
+            </a:r>
+          </a:p>
+          <a:p>
+            <a:pPr marL="0" indent="0">
+              <a:buNone/>
+            </a:pPr>
+            <a:r>
+              <a:rPr lang="pt-BR" sz="3200" dirty="0" smtClean="0"/>
+              <a:t>  </a:t>
+            </a:r>
+            <a:r>
+              <a:rPr lang="pt-BR" sz="3200" dirty="0" err="1" smtClean="0"/>
+              <a:t>const</a:t>
+            </a:r>
+            <a:r>
+              <a:rPr lang="pt-BR" sz="3200" dirty="0" smtClean="0"/>
+              <a:t> </a:t>
+            </a:r>
+            <a:r>
+              <a:rPr lang="pt-BR" sz="3200" dirty="0" err="1"/>
+              <a:t>navigate</a:t>
+            </a:r>
+            <a:r>
+              <a:rPr lang="pt-BR" sz="3200" dirty="0"/>
+              <a:t> = </a:t>
+            </a:r>
+            <a:r>
+              <a:rPr lang="pt-BR" sz="3200" dirty="0" err="1"/>
+              <a:t>useNavigate</a:t>
+            </a:r>
+            <a:r>
+              <a:rPr lang="pt-BR" sz="3200" dirty="0" smtClean="0"/>
+              <a:t>();</a:t>
+            </a:r>
+          </a:p>
+          <a:p>
+            <a:pPr marL="0" indent="0">
+              <a:buNone/>
+            </a:pPr>
+            <a:endParaRPr lang="pt-BR" sz="2000" dirty="0">
+              <a:latin typeface="Altone Variable" pitchFamily="2" charset="0"/>
+            </a:endParaRPr>
+          </a:p>
+          <a:p>
+            <a:pPr marL="0" indent="0">
+              <a:buNone/>
+            </a:pPr>
+            <a:r>
+              <a:rPr lang="pt-BR" sz="3200" dirty="0"/>
+              <a:t/>
+            </a:r>
+            <a:br>
+              <a:rPr lang="pt-BR" sz="3200" dirty="0"/>
+            </a:br>
+            <a:endParaRPr lang="pt-BR" sz="3200" dirty="0" smtClean="0">
+              <a:latin typeface="Altone Variable" pitchFamily="2" charset="0"/>
+            </a:endParaRPr>
+          </a:p>
+        </p:txBody>
+      </p:sp>
+    </p:spTree>
+    <p:extLst>
+      <p:ext uri="{BB962C8B-B14F-4D97-AF65-F5344CB8AC3E}">
+        <p14:creationId xmlns:p14="http://schemas.microsoft.com/office/powerpoint/2010/main" val="3766861883"/>
+      </p:ext>
+    </p:extLst>
+  </p:cSld>
+  <p:clrMapOvr>
+    <a:masterClrMapping/>
+  </p:clrMapOvr>
+  <p:timing>
+    <p:tnLst>
+      <p:par>
+        <p:cTn id="1" dur="indefinite" restart="never" nodeType="tmRoot"/>
+      </p:par>
+    </p:tnLst>
+  </p:timing>
+</p:sld>
+</file>
+
+<file path=ppt/slides/slide28.xml><?xml version="1.0" encoding="utf-8"?>
 <p:sld xmlns:a="http://schemas.openxmlformats.org/drawingml/2006/main" xmlns:r="http://schemas.openxmlformats.org/officeDocument/2006/relationships" xmlns:p="http://schemas.openxmlformats.org/presentationml/2006/main">
   <p:cSld>
     <p:spTree>
@@ -5979,681 +6853,6 @@
 </p:sld>
 </file>
 
-<file path=ppt/slides/slide25.xml><?xml version="1.0" encoding="utf-8"?>
-<p:sld xmlns:a="http://schemas.openxmlformats.org/drawingml/2006/main" xmlns:r="http://schemas.openxmlformats.org/officeDocument/2006/relationships" xmlns:p="http://schemas.openxmlformats.org/presentationml/2006/main">
-  <p:cSld>
-    <p:spTree>
-      <p:nvGrpSpPr>
-        <p:cNvPr id="1" name=""/>
-        <p:cNvGrpSpPr/>
-        <p:nvPr/>
-      </p:nvGrpSpPr>
-      <p:grpSpPr>
-        <a:xfrm>
-          <a:off x="0" y="0"/>
-          <a:ext cx="0" cy="0"/>
-          <a:chOff x="0" y="0"/>
-          <a:chExt cx="0" cy="0"/>
-        </a:xfrm>
-      </p:grpSpPr>
-      <p:sp>
-        <p:nvSpPr>
-          <p:cNvPr id="2" name="Título 1"/>
-          <p:cNvSpPr>
-            <a:spLocks noGrp="1"/>
-          </p:cNvSpPr>
-          <p:nvPr>
-            <p:ph type="title"/>
-          </p:nvPr>
-        </p:nvSpPr>
-        <p:spPr/>
-        <p:txBody>
-          <a:bodyPr/>
-          <a:lstStyle/>
-          <a:p>
-            <a:pPr algn="ctr"/>
-            <a:r>
-              <a:rPr lang="pt-BR" dirty="0">
-                <a:latin typeface="Altone Variable Semi Bold" pitchFamily="2" charset="0"/>
-              </a:rPr>
-              <a:t>Requisições à API</a:t>
-            </a:r>
-          </a:p>
-        </p:txBody>
-      </p:sp>
-      <p:sp>
-        <p:nvSpPr>
-          <p:cNvPr id="3" name="Espaço Reservado para Conteúdo 2"/>
-          <p:cNvSpPr>
-            <a:spLocks noGrp="1"/>
-          </p:cNvSpPr>
-          <p:nvPr>
-            <p:ph idx="1"/>
-          </p:nvPr>
-        </p:nvSpPr>
-        <p:spPr>
-          <a:xfrm>
-            <a:off x="838200" y="2210186"/>
-            <a:ext cx="10220058" cy="3301852"/>
-          </a:xfrm>
-        </p:spPr>
-        <p:txBody>
-          <a:bodyPr>
-            <a:normAutofit/>
-          </a:bodyPr>
-          <a:lstStyle/>
-          <a:p>
-            <a:r>
-              <a:rPr lang="pt-BR" dirty="0">
-                <a:latin typeface="Altone Variable" pitchFamily="2" charset="0"/>
-              </a:rPr>
-              <a:t>Nas requisições uma função </a:t>
-            </a:r>
-            <a:r>
-              <a:rPr lang="pt-BR" dirty="0" err="1">
-                <a:latin typeface="Altone Variable" pitchFamily="2" charset="0"/>
-              </a:rPr>
-              <a:t>javascript</a:t>
-            </a:r>
-            <a:r>
-              <a:rPr lang="pt-BR" dirty="0">
-                <a:latin typeface="Altone Variable" pitchFamily="2" charset="0"/>
-              </a:rPr>
-              <a:t> </a:t>
-            </a:r>
-            <a:r>
-              <a:rPr lang="pt-BR" dirty="0" smtClean="0">
-                <a:latin typeface="Altone Variable" pitchFamily="2" charset="0"/>
-              </a:rPr>
-              <a:t>vai fazer uma requisição </a:t>
-            </a:r>
-            <a:r>
-              <a:rPr lang="pt-BR" dirty="0">
-                <a:latin typeface="Altone Variable" pitchFamily="2" charset="0"/>
-              </a:rPr>
-              <a:t>para </a:t>
-            </a:r>
-            <a:r>
-              <a:rPr lang="pt-BR" dirty="0" err="1">
-                <a:latin typeface="Altone Variable" pitchFamily="2" charset="0"/>
-              </a:rPr>
-              <a:t>para</a:t>
-            </a:r>
-            <a:r>
-              <a:rPr lang="pt-BR" dirty="0">
-                <a:latin typeface="Altone Variable" pitchFamily="2" charset="0"/>
-              </a:rPr>
-              <a:t> a </a:t>
-            </a:r>
-            <a:r>
-              <a:rPr lang="pt-BR" dirty="0" err="1" smtClean="0">
-                <a:latin typeface="Altone Variable" pitchFamily="2" charset="0"/>
-              </a:rPr>
-              <a:t>api</a:t>
-            </a:r>
-            <a:r>
-              <a:rPr lang="pt-BR" dirty="0" smtClean="0">
-                <a:latin typeface="Altone Variable" pitchFamily="2" charset="0"/>
-              </a:rPr>
-              <a:t> retornar </a:t>
-            </a:r>
-            <a:r>
-              <a:rPr lang="pt-BR" dirty="0">
-                <a:latin typeface="Altone Variable" pitchFamily="2" charset="0"/>
-              </a:rPr>
-              <a:t>uma determinada informação. A comunicação entre essas partes do sistema</a:t>
-            </a:r>
-          </a:p>
-          <a:p>
-            <a:r>
-              <a:rPr lang="pt-BR" dirty="0">
-                <a:latin typeface="Altone Variable" pitchFamily="2" charset="0"/>
-              </a:rPr>
-              <a:t>pode ser feita a partir do </a:t>
-            </a:r>
-            <a:r>
-              <a:rPr lang="pt-BR" b="1" dirty="0">
-                <a:latin typeface="Altone Variable" pitchFamily="2" charset="0"/>
-              </a:rPr>
-              <a:t>método HTTP</a:t>
-            </a:r>
-            <a:r>
-              <a:rPr lang="pt-BR" dirty="0">
-                <a:latin typeface="Altone Variable" pitchFamily="2" charset="0"/>
-              </a:rPr>
-              <a:t>, que </a:t>
-            </a:r>
-            <a:r>
-              <a:rPr lang="pt-BR" dirty="0" smtClean="0">
-                <a:latin typeface="Altone Variable" pitchFamily="2" charset="0"/>
-              </a:rPr>
-              <a:t>é um </a:t>
-            </a:r>
-            <a:r>
-              <a:rPr lang="pt-BR" dirty="0">
-                <a:latin typeface="Altone Variable" pitchFamily="2" charset="0"/>
-              </a:rPr>
-              <a:t>protocolo de comunicação onde através </a:t>
-            </a:r>
-            <a:r>
-              <a:rPr lang="pt-BR" dirty="0" smtClean="0">
-                <a:latin typeface="Altone Variable" pitchFamily="2" charset="0"/>
-              </a:rPr>
-              <a:t>dele é </a:t>
-            </a:r>
-            <a:r>
-              <a:rPr lang="pt-BR" dirty="0">
-                <a:latin typeface="Altone Variable" pitchFamily="2" charset="0"/>
-              </a:rPr>
-              <a:t>possível a comunicação entre os </a:t>
-            </a:r>
-            <a:r>
-              <a:rPr lang="pt-BR" dirty="0" smtClean="0">
-                <a:latin typeface="Altone Variable" pitchFamily="2" charset="0"/>
-              </a:rPr>
-              <a:t>diferentes pontos </a:t>
-            </a:r>
-            <a:r>
-              <a:rPr lang="pt-BR" dirty="0">
-                <a:latin typeface="Altone Variable" pitchFamily="2" charset="0"/>
-              </a:rPr>
-              <a:t>de um sistema.</a:t>
-            </a:r>
-          </a:p>
-        </p:txBody>
-      </p:sp>
-    </p:spTree>
-    <p:extLst>
-      <p:ext uri="{BB962C8B-B14F-4D97-AF65-F5344CB8AC3E}">
-        <p14:creationId xmlns:p14="http://schemas.microsoft.com/office/powerpoint/2010/main" val="1218642432"/>
-      </p:ext>
-    </p:extLst>
-  </p:cSld>
-  <p:clrMapOvr>
-    <a:masterClrMapping/>
-  </p:clrMapOvr>
-</p:sld>
-</file>
-
-<file path=ppt/slides/slide26.xml><?xml version="1.0" encoding="utf-8"?>
-<p:sld xmlns:a="http://schemas.openxmlformats.org/drawingml/2006/main" xmlns:r="http://schemas.openxmlformats.org/officeDocument/2006/relationships" xmlns:p="http://schemas.openxmlformats.org/presentationml/2006/main">
-  <p:cSld>
-    <p:spTree>
-      <p:nvGrpSpPr>
-        <p:cNvPr id="1" name=""/>
-        <p:cNvGrpSpPr/>
-        <p:nvPr/>
-      </p:nvGrpSpPr>
-      <p:grpSpPr>
-        <a:xfrm>
-          <a:off x="0" y="0"/>
-          <a:ext cx="0" cy="0"/>
-          <a:chOff x="0" y="0"/>
-          <a:chExt cx="0" cy="0"/>
-        </a:xfrm>
-      </p:grpSpPr>
-      <p:sp>
-        <p:nvSpPr>
-          <p:cNvPr id="2" name="Título 1"/>
-          <p:cNvSpPr>
-            <a:spLocks noGrp="1"/>
-          </p:cNvSpPr>
-          <p:nvPr>
-            <p:ph type="title"/>
-          </p:nvPr>
-        </p:nvSpPr>
-        <p:spPr/>
-        <p:txBody>
-          <a:bodyPr/>
-          <a:lstStyle/>
-          <a:p>
-            <a:pPr algn="ctr"/>
-            <a:r>
-              <a:rPr lang="pt-BR" dirty="0">
-                <a:latin typeface="Altone Variable Semi Bold" pitchFamily="2" charset="0"/>
-              </a:rPr>
-              <a:t>Requisições à API</a:t>
-            </a:r>
-          </a:p>
-        </p:txBody>
-      </p:sp>
-      <p:sp>
-        <p:nvSpPr>
-          <p:cNvPr id="3" name="Espaço Reservado para Conteúdo 2"/>
-          <p:cNvSpPr>
-            <a:spLocks noGrp="1"/>
-          </p:cNvSpPr>
-          <p:nvPr>
-            <p:ph idx="1"/>
-          </p:nvPr>
-        </p:nvSpPr>
-        <p:spPr>
-          <a:xfrm>
-            <a:off x="838200" y="2210186"/>
-            <a:ext cx="10220058" cy="3301852"/>
-          </a:xfrm>
-        </p:spPr>
-        <p:txBody>
-          <a:bodyPr>
-            <a:normAutofit/>
-          </a:bodyPr>
-          <a:lstStyle/>
-          <a:p>
-            <a:r>
-              <a:rPr lang="pt-BR" dirty="0">
-                <a:latin typeface="Altone Variable" pitchFamily="2" charset="0"/>
-              </a:rPr>
-              <a:t>O protocolo HTTP possui métodos que são </a:t>
-            </a:r>
-            <a:r>
-              <a:rPr lang="pt-BR" dirty="0" smtClean="0">
-                <a:latin typeface="Altone Variable" pitchFamily="2" charset="0"/>
-              </a:rPr>
-              <a:t>utilizados para </a:t>
-            </a:r>
-            <a:r>
-              <a:rPr lang="pt-BR" dirty="0">
-                <a:latin typeface="Altone Variable" pitchFamily="2" charset="0"/>
-              </a:rPr>
-              <a:t>diferentes finalidades</a:t>
-            </a:r>
-            <a:r>
-              <a:rPr lang="pt-BR" dirty="0" smtClean="0">
-                <a:latin typeface="Altone Variable" pitchFamily="2" charset="0"/>
-              </a:rPr>
-              <a:t>.</a:t>
-            </a:r>
-          </a:p>
-          <a:p>
-            <a:endParaRPr lang="pt-BR" dirty="0">
-              <a:latin typeface="Altone Variable" pitchFamily="2" charset="0"/>
-            </a:endParaRPr>
-          </a:p>
-          <a:p>
-            <a:r>
-              <a:rPr lang="pt-BR" dirty="0">
-                <a:latin typeface="Altone Variable" pitchFamily="2" charset="0"/>
-              </a:rPr>
-              <a:t>Os principais que veremos são </a:t>
-            </a:r>
-            <a:r>
-              <a:rPr lang="pt-BR" b="1" dirty="0">
-                <a:latin typeface="Altone Variable" pitchFamily="2" charset="0"/>
-              </a:rPr>
-              <a:t>GET, POST, PUT </a:t>
-            </a:r>
-            <a:r>
-              <a:rPr lang="pt-BR" dirty="0" smtClean="0">
-                <a:latin typeface="Altone Variable" pitchFamily="2" charset="0"/>
-              </a:rPr>
-              <a:t>e</a:t>
-            </a:r>
-            <a:r>
-              <a:rPr lang="pt-BR" b="1" dirty="0" smtClean="0">
-                <a:latin typeface="Altone Variable" pitchFamily="2" charset="0"/>
-              </a:rPr>
-              <a:t> DELETE</a:t>
-            </a:r>
-            <a:r>
-              <a:rPr lang="pt-BR" dirty="0">
-                <a:latin typeface="Altone Variable" pitchFamily="2" charset="0"/>
-              </a:rPr>
-              <a:t>.</a:t>
-            </a:r>
-          </a:p>
-        </p:txBody>
-      </p:sp>
-    </p:spTree>
-    <p:extLst>
-      <p:ext uri="{BB962C8B-B14F-4D97-AF65-F5344CB8AC3E}">
-        <p14:creationId xmlns:p14="http://schemas.microsoft.com/office/powerpoint/2010/main" val="3768773745"/>
-      </p:ext>
-    </p:extLst>
-  </p:cSld>
-  <p:clrMapOvr>
-    <a:masterClrMapping/>
-  </p:clrMapOvr>
-</p:sld>
-</file>
-
-<file path=ppt/slides/slide27.xml><?xml version="1.0" encoding="utf-8"?>
-<p:sld xmlns:a="http://schemas.openxmlformats.org/drawingml/2006/main" xmlns:r="http://schemas.openxmlformats.org/officeDocument/2006/relationships" xmlns:p="http://schemas.openxmlformats.org/presentationml/2006/main">
-  <p:cSld>
-    <p:spTree>
-      <p:nvGrpSpPr>
-        <p:cNvPr id="1" name=""/>
-        <p:cNvGrpSpPr/>
-        <p:nvPr/>
-      </p:nvGrpSpPr>
-      <p:grpSpPr>
-        <a:xfrm>
-          <a:off x="0" y="0"/>
-          <a:ext cx="0" cy="0"/>
-          <a:chOff x="0" y="0"/>
-          <a:chExt cx="0" cy="0"/>
-        </a:xfrm>
-      </p:grpSpPr>
-      <p:sp>
-        <p:nvSpPr>
-          <p:cNvPr id="2" name="Título 1"/>
-          <p:cNvSpPr>
-            <a:spLocks noGrp="1"/>
-          </p:cNvSpPr>
-          <p:nvPr>
-            <p:ph type="title"/>
-          </p:nvPr>
-        </p:nvSpPr>
-        <p:spPr/>
-        <p:txBody>
-          <a:bodyPr/>
-          <a:lstStyle/>
-          <a:p>
-            <a:pPr algn="ctr"/>
-            <a:r>
-              <a:rPr lang="pt-BR" dirty="0">
-                <a:latin typeface="Altone Variable Semi Bold" pitchFamily="2" charset="0"/>
-              </a:rPr>
-              <a:t>Requisições à API</a:t>
-            </a:r>
-          </a:p>
-        </p:txBody>
-      </p:sp>
-      <p:sp>
-        <p:nvSpPr>
-          <p:cNvPr id="3" name="Espaço Reservado para Conteúdo 2"/>
-          <p:cNvSpPr>
-            <a:spLocks noGrp="1"/>
-          </p:cNvSpPr>
-          <p:nvPr>
-            <p:ph idx="1"/>
-          </p:nvPr>
-        </p:nvSpPr>
-        <p:spPr>
-          <a:xfrm>
-            <a:off x="906566" y="2346919"/>
-            <a:ext cx="10220058" cy="3301852"/>
-          </a:xfrm>
-        </p:spPr>
-        <p:txBody>
-          <a:bodyPr>
-            <a:normAutofit/>
-          </a:bodyPr>
-          <a:lstStyle/>
-          <a:p>
-            <a:r>
-              <a:rPr lang="pt-BR" b="1" dirty="0">
-                <a:solidFill>
-                  <a:schemeClr val="accent1"/>
-                </a:solidFill>
-                <a:latin typeface="Altone Variable" pitchFamily="2" charset="0"/>
-              </a:rPr>
-              <a:t>GET</a:t>
-            </a:r>
-            <a:r>
-              <a:rPr lang="pt-BR" dirty="0">
-                <a:solidFill>
-                  <a:schemeClr val="accent1"/>
-                </a:solidFill>
-                <a:latin typeface="Altone Variable" pitchFamily="2" charset="0"/>
-              </a:rPr>
-              <a:t> </a:t>
-            </a:r>
-            <a:r>
-              <a:rPr lang="pt-BR" dirty="0" smtClean="0">
-                <a:latin typeface="Altone Variable" pitchFamily="2" charset="0"/>
-              </a:rPr>
-              <a:t>tem </a:t>
-            </a:r>
-            <a:r>
-              <a:rPr lang="pt-BR" dirty="0">
-                <a:latin typeface="Altone Variable" pitchFamily="2" charset="0"/>
-              </a:rPr>
-              <a:t>a função de </a:t>
-            </a:r>
-            <a:r>
-              <a:rPr lang="pt-BR" dirty="0" smtClean="0">
-                <a:latin typeface="Altone Variable" pitchFamily="2" charset="0"/>
-              </a:rPr>
-              <a:t>pegar dados </a:t>
-            </a:r>
-            <a:r>
-              <a:rPr lang="pt-BR" dirty="0">
-                <a:latin typeface="Altone Variable" pitchFamily="2" charset="0"/>
-              </a:rPr>
-              <a:t>do </a:t>
-            </a:r>
-            <a:r>
-              <a:rPr lang="pt-BR" dirty="0" smtClean="0">
-                <a:latin typeface="Altone Variable" pitchFamily="2" charset="0"/>
-              </a:rPr>
-              <a:t>servidor.</a:t>
-            </a:r>
-          </a:p>
-          <a:p>
-            <a:r>
-              <a:rPr lang="pt-BR" b="1" dirty="0">
-                <a:solidFill>
-                  <a:schemeClr val="accent6"/>
-                </a:solidFill>
-                <a:latin typeface="Altone Variable" pitchFamily="2" charset="0"/>
-              </a:rPr>
-              <a:t>POST</a:t>
-            </a:r>
-            <a:r>
-              <a:rPr lang="pt-BR" dirty="0">
-                <a:latin typeface="Altone Variable" pitchFamily="2" charset="0"/>
-              </a:rPr>
-              <a:t> tem a função de </a:t>
-            </a:r>
-            <a:r>
-              <a:rPr lang="pt-BR" dirty="0" smtClean="0">
-                <a:latin typeface="Altone Variable" pitchFamily="2" charset="0"/>
-              </a:rPr>
-              <a:t>transmitir dados </a:t>
-            </a:r>
-            <a:r>
-              <a:rPr lang="pt-BR" dirty="0">
-                <a:latin typeface="Altone Variable" pitchFamily="2" charset="0"/>
-              </a:rPr>
-              <a:t>para o servidor</a:t>
-            </a:r>
-            <a:r>
-              <a:rPr lang="pt-BR" dirty="0" smtClean="0">
-                <a:latin typeface="Altone Variable" pitchFamily="2" charset="0"/>
-              </a:rPr>
-              <a:t>.</a:t>
-            </a:r>
-          </a:p>
-          <a:p>
-            <a:r>
-              <a:rPr lang="pt-BR" b="1" dirty="0">
-                <a:solidFill>
-                  <a:schemeClr val="accent2"/>
-                </a:solidFill>
-                <a:latin typeface="Altone Variable" pitchFamily="2" charset="0"/>
-              </a:rPr>
-              <a:t>PUT</a:t>
-            </a:r>
-            <a:r>
-              <a:rPr lang="pt-BR" dirty="0">
-                <a:solidFill>
-                  <a:schemeClr val="accent2"/>
-                </a:solidFill>
-                <a:latin typeface="Altone Variable" pitchFamily="2" charset="0"/>
-              </a:rPr>
-              <a:t> </a:t>
-            </a:r>
-            <a:r>
-              <a:rPr lang="pt-BR" dirty="0">
-                <a:latin typeface="Altone Variable" pitchFamily="2" charset="0"/>
-              </a:rPr>
-              <a:t>tem a função de substituir </a:t>
-            </a:r>
-            <a:r>
-              <a:rPr lang="pt-BR" dirty="0" smtClean="0">
-                <a:latin typeface="Altone Variable" pitchFamily="2" charset="0"/>
-              </a:rPr>
-              <a:t>os dados </a:t>
-            </a:r>
-            <a:r>
-              <a:rPr lang="pt-BR" dirty="0">
-                <a:latin typeface="Altone Variable" pitchFamily="2" charset="0"/>
-              </a:rPr>
-              <a:t>do servidor</a:t>
-            </a:r>
-            <a:r>
-              <a:rPr lang="pt-BR" dirty="0" smtClean="0">
-                <a:latin typeface="Altone Variable" pitchFamily="2" charset="0"/>
-              </a:rPr>
-              <a:t>.</a:t>
-            </a:r>
-            <a:endParaRPr lang="pt-BR" dirty="0">
-              <a:latin typeface="Altone Variable" pitchFamily="2" charset="0"/>
-            </a:endParaRPr>
-          </a:p>
-          <a:p>
-            <a:r>
-              <a:rPr lang="pt-BR" b="1" dirty="0">
-                <a:solidFill>
-                  <a:srgbClr val="FF0000"/>
-                </a:solidFill>
-                <a:latin typeface="Altone Variable" pitchFamily="2" charset="0"/>
-              </a:rPr>
-              <a:t>DELETE</a:t>
-            </a:r>
-            <a:r>
-              <a:rPr lang="pt-BR" dirty="0">
-                <a:latin typeface="Altone Variable" pitchFamily="2" charset="0"/>
-              </a:rPr>
-              <a:t> tem a função de apagar dados </a:t>
-            </a:r>
-            <a:r>
-              <a:rPr lang="pt-BR" dirty="0" smtClean="0">
-                <a:latin typeface="Altone Variable" pitchFamily="2" charset="0"/>
-              </a:rPr>
-              <a:t>do servidor</a:t>
-            </a:r>
-            <a:r>
-              <a:rPr lang="pt-BR" dirty="0">
-                <a:latin typeface="Altone Variable" pitchFamily="2" charset="0"/>
-              </a:rPr>
-              <a:t>.</a:t>
-            </a:r>
-          </a:p>
-        </p:txBody>
-      </p:sp>
-    </p:spTree>
-    <p:extLst>
-      <p:ext uri="{BB962C8B-B14F-4D97-AF65-F5344CB8AC3E}">
-        <p14:creationId xmlns:p14="http://schemas.microsoft.com/office/powerpoint/2010/main" val="2456015423"/>
-      </p:ext>
-    </p:extLst>
-  </p:cSld>
-  <p:clrMapOvr>
-    <a:masterClrMapping/>
-  </p:clrMapOvr>
-</p:sld>
-</file>
-
-<file path=ppt/slides/slide28.xml><?xml version="1.0" encoding="utf-8"?>
-<p:sld xmlns:a="http://schemas.openxmlformats.org/drawingml/2006/main" xmlns:r="http://schemas.openxmlformats.org/officeDocument/2006/relationships" xmlns:p="http://schemas.openxmlformats.org/presentationml/2006/main">
-  <p:cSld>
-    <p:spTree>
-      <p:nvGrpSpPr>
-        <p:cNvPr id="1" name=""/>
-        <p:cNvGrpSpPr/>
-        <p:nvPr/>
-      </p:nvGrpSpPr>
-      <p:grpSpPr>
-        <a:xfrm>
-          <a:off x="0" y="0"/>
-          <a:ext cx="0" cy="0"/>
-          <a:chOff x="0" y="0"/>
-          <a:chExt cx="0" cy="0"/>
-        </a:xfrm>
-      </p:grpSpPr>
-      <p:sp>
-        <p:nvSpPr>
-          <p:cNvPr id="2" name="Título 1"/>
-          <p:cNvSpPr>
-            <a:spLocks noGrp="1"/>
-          </p:cNvSpPr>
-          <p:nvPr>
-            <p:ph type="title"/>
-          </p:nvPr>
-        </p:nvSpPr>
-        <p:spPr/>
-        <p:txBody>
-          <a:bodyPr/>
-          <a:lstStyle/>
-          <a:p>
-            <a:pPr algn="ctr"/>
-            <a:r>
-              <a:rPr lang="pt-BR" dirty="0" smtClean="0">
-                <a:latin typeface="Altone Variable Semi Bold" pitchFamily="2" charset="0"/>
-              </a:rPr>
-              <a:t>Rotas e Navegação</a:t>
-            </a:r>
-            <a:endParaRPr lang="pt-BR" dirty="0">
-              <a:latin typeface="Altone Variable Semi Bold" pitchFamily="2" charset="0"/>
-            </a:endParaRPr>
-          </a:p>
-        </p:txBody>
-      </p:sp>
-      <p:pic>
-        <p:nvPicPr>
-          <p:cNvPr id="1026" name="Picture 2" descr="Sobre os navios | ONE PIECE FOREVER WORLD [RPG] Amino"/>
-          <p:cNvPicPr>
-            <a:picLocks noChangeAspect="1" noChangeArrowheads="1" noCrop="1"/>
-          </p:cNvPicPr>
-          <p:nvPr/>
-        </p:nvPicPr>
-        <p:blipFill>
-          <a:blip r:embed="rId2">
-            <a:extLst>
-              <a:ext uri="{28A0092B-C50C-407E-A947-70E740481C1C}">
-                <a14:useLocalDpi xmlns:a14="http://schemas.microsoft.com/office/drawing/2010/main" val="0"/>
-              </a:ext>
-            </a:extLst>
-          </a:blip>
-          <a:srcRect/>
-          <a:stretch>
-            <a:fillRect/>
-          </a:stretch>
-        </p:blipFill>
-        <p:spPr bwMode="auto">
-          <a:xfrm>
-            <a:off x="3148576" y="1851233"/>
-            <a:ext cx="5894848" cy="4421136"/>
-          </a:xfrm>
-          <a:prstGeom prst="rect">
-            <a:avLst/>
-          </a:prstGeom>
-          <a:noFill/>
-          <a:extLst>
-            <a:ext uri="{909E8E84-426E-40DD-AFC4-6F175D3DCCD1}">
-              <a14:hiddenFill xmlns:a14="http://schemas.microsoft.com/office/drawing/2010/main">
-                <a:solidFill>
-                  <a:srgbClr val="FFFFFF"/>
-                </a:solidFill>
-              </a14:hiddenFill>
-            </a:ext>
-          </a:extLst>
-        </p:spPr>
-      </p:pic>
-    </p:spTree>
-    <p:extLst>
-      <p:ext uri="{BB962C8B-B14F-4D97-AF65-F5344CB8AC3E}">
-        <p14:creationId xmlns:p14="http://schemas.microsoft.com/office/powerpoint/2010/main" val="2798432597"/>
-      </p:ext>
-    </p:extLst>
-  </p:cSld>
-  <p:clrMapOvr>
-    <a:masterClrMapping/>
-  </p:clrMapOvr>
-</p:sld>
-</file>
-
 <file path=ppt/slides/slide29.xml><?xml version="1.0" encoding="utf-8"?>
 <p:sld xmlns:a="http://schemas.openxmlformats.org/drawingml/2006/main" xmlns:r="http://schemas.openxmlformats.org/officeDocument/2006/relationships" xmlns:p="http://schemas.openxmlformats.org/presentationml/2006/main">
   <p:cSld>
@@ -6688,14 +6887,11 @@
           <a:p>
             <a:pPr algn="ctr"/>
             <a:r>
-              <a:rPr lang="pt-BR" dirty="0" smtClean="0">
+              <a:rPr lang="pt-BR" dirty="0">
                 <a:latin typeface="Altone Variable Semi Bold" pitchFamily="2" charset="0"/>
               </a:rPr>
-              <a:t>Rotas</a:t>
-            </a:r>
-            <a:endParaRPr lang="pt-BR" dirty="0">
-              <a:latin typeface="Altone Variable Semi Bold" pitchFamily="2" charset="0"/>
-            </a:endParaRPr>
+              <a:t>Requisições à API</a:t>
+            </a:r>
           </a:p>
         </p:txBody>
       </p:sp>
@@ -6711,7 +6907,7 @@
         </p:nvSpPr>
         <p:spPr>
           <a:xfrm>
-            <a:off x="906566" y="2346919"/>
+            <a:off x="838200" y="2210186"/>
             <a:ext cx="10220058" cy="3301852"/>
           </a:xfrm>
         </p:spPr>
@@ -6725,158 +6921,125 @@
               <a:rPr lang="pt-BR" dirty="0">
                 <a:latin typeface="Altone Variable" pitchFamily="2" charset="0"/>
               </a:rPr>
-              <a:t>Rotas são como páginas internas </a:t>
-            </a:r>
-            <a:r>
-              <a:rPr lang="pt-BR" dirty="0" smtClean="0">
-                <a:latin typeface="Altone Variable" pitchFamily="2" charset="0"/>
-              </a:rPr>
-              <a:t>do site</a:t>
-            </a:r>
-            <a:r>
-              <a:rPr lang="pt-BR" dirty="0">
-                <a:latin typeface="Altone Variable" pitchFamily="2" charset="0"/>
-              </a:rPr>
-              <a:t>. Entretanto, não são </a:t>
-            </a:r>
-            <a:r>
-              <a:rPr lang="pt-BR" dirty="0" smtClean="0">
-                <a:latin typeface="Altone Variable" pitchFamily="2" charset="0"/>
-              </a:rPr>
-              <a:t>acionados endereços </a:t>
-            </a:r>
-            <a:r>
-              <a:rPr lang="pt-BR" dirty="0">
-                <a:latin typeface="Altone Variable" pitchFamily="2" charset="0"/>
-              </a:rPr>
-              <a:t>do servidor, toda </a:t>
-            </a:r>
-            <a:r>
-              <a:rPr lang="pt-BR" dirty="0" smtClean="0">
-                <a:latin typeface="Altone Variable" pitchFamily="2" charset="0"/>
-              </a:rPr>
-              <a:t>a </a:t>
+              <a:t>Nas requisições uma função </a:t>
+            </a:r>
+            <a:r>
+              <a:rPr lang="pt-BR" dirty="0" err="1">
+                <a:latin typeface="Altone Variable" pitchFamily="2" charset="0"/>
+              </a:rPr>
+              <a:t>javascript</a:t>
+            </a:r>
+            <a:r>
+              <a:rPr lang="pt-BR" dirty="0">
+                <a:latin typeface="Altone Variable" pitchFamily="2" charset="0"/>
+              </a:rPr>
+              <a:t> </a:t>
+            </a:r>
+            <a:r>
+              <a:rPr lang="pt-BR" dirty="0" smtClean="0">
+                <a:latin typeface="Altone Variable" pitchFamily="2" charset="0"/>
+              </a:rPr>
+              <a:t>vai fazer uma requisição </a:t>
+            </a:r>
+            <a:r>
+              <a:rPr lang="pt-BR" dirty="0">
+                <a:latin typeface="Altone Variable" pitchFamily="2" charset="0"/>
+              </a:rPr>
+              <a:t>para </a:t>
+            </a:r>
+            <a:r>
+              <a:rPr lang="pt-BR" dirty="0" err="1">
+                <a:latin typeface="Altone Variable" pitchFamily="2" charset="0"/>
+              </a:rPr>
+              <a:t>para</a:t>
+            </a:r>
+            <a:r>
+              <a:rPr lang="pt-BR" dirty="0">
+                <a:latin typeface="Altone Variable" pitchFamily="2" charset="0"/>
+              </a:rPr>
+              <a:t> a </a:t>
             </a:r>
             <a:r>
               <a:rPr lang="pt-BR" dirty="0" err="1" smtClean="0">
                 <a:latin typeface="Altone Variable" pitchFamily="2" charset="0"/>
               </a:rPr>
-              <a:t>renderização</a:t>
-            </a:r>
-            <a:r>
-              <a:rPr lang="pt-BR" dirty="0" smtClean="0">
-                <a:latin typeface="Altone Variable" pitchFamily="2" charset="0"/>
-              </a:rPr>
-              <a:t> </a:t>
-            </a:r>
-            <a:r>
-              <a:rPr lang="pt-BR" dirty="0">
-                <a:latin typeface="Altone Variable" pitchFamily="2" charset="0"/>
-              </a:rPr>
-              <a:t>fica no próprio </a:t>
-            </a:r>
-            <a:r>
-              <a:rPr lang="pt-BR" dirty="0" err="1">
-                <a:latin typeface="Altone Variable" pitchFamily="2" charset="0"/>
-              </a:rPr>
-              <a:t>frontend</a:t>
-            </a:r>
-            <a:r>
-              <a:rPr lang="pt-BR" dirty="0" smtClean="0">
-                <a:latin typeface="Altone Variable" pitchFamily="2" charset="0"/>
-              </a:rPr>
-              <a:t>.</a:t>
-            </a:r>
-          </a:p>
-          <a:p>
-            <a:r>
-              <a:rPr lang="pt-BR" dirty="0">
-                <a:latin typeface="Altone Variable" pitchFamily="2" charset="0"/>
-              </a:rPr>
-              <a:t>Graças ao HTML5, o uso do # não </a:t>
-            </a:r>
-            <a:r>
-              <a:rPr lang="pt-BR" dirty="0" smtClean="0">
-                <a:latin typeface="Altone Variable" pitchFamily="2" charset="0"/>
-              </a:rPr>
-              <a:t>é mais </a:t>
-            </a:r>
-            <a:r>
-              <a:rPr lang="pt-BR" dirty="0">
-                <a:latin typeface="Altone Variable" pitchFamily="2" charset="0"/>
-              </a:rPr>
-              <a:t>necessário para acessar </a:t>
-            </a:r>
-            <a:r>
-              <a:rPr lang="pt-BR" dirty="0" smtClean="0">
-                <a:latin typeface="Altone Variable" pitchFamily="2" charset="0"/>
-              </a:rPr>
-              <a:t>âncoras. Com </a:t>
-            </a:r>
-            <a:r>
-              <a:rPr lang="pt-BR" dirty="0">
-                <a:latin typeface="Altone Variable" pitchFamily="2" charset="0"/>
-              </a:rPr>
-              <a:t>isso, o endereço na barra </a:t>
-            </a:r>
-            <a:r>
-              <a:rPr lang="pt-BR" dirty="0" smtClean="0">
-                <a:latin typeface="Altone Variable" pitchFamily="2" charset="0"/>
-              </a:rPr>
-              <a:t>do navegador </a:t>
-            </a:r>
-            <a:r>
-              <a:rPr lang="pt-BR" dirty="0">
-                <a:latin typeface="Altone Variable" pitchFamily="2" charset="0"/>
-              </a:rPr>
-              <a:t>se parece com uma </a:t>
-            </a:r>
-            <a:r>
-              <a:rPr lang="pt-BR" dirty="0" smtClean="0">
-                <a:latin typeface="Altone Variable" pitchFamily="2" charset="0"/>
-              </a:rPr>
-              <a:t>URL normal</a:t>
-            </a:r>
-            <a:r>
-              <a:rPr lang="pt-BR" dirty="0">
-                <a:latin typeface="Altone Variable" pitchFamily="2" charset="0"/>
-              </a:rPr>
-              <a:t>, mas é uma rota </a:t>
-            </a:r>
-            <a:r>
-              <a:rPr lang="pt-BR" dirty="0" smtClean="0">
-                <a:latin typeface="Altone Variable" pitchFamily="2" charset="0"/>
-              </a:rPr>
-              <a:t>interpretada apenas </a:t>
-            </a:r>
-            <a:r>
-              <a:rPr lang="pt-BR" dirty="0">
-                <a:latin typeface="Altone Variable" pitchFamily="2" charset="0"/>
-              </a:rPr>
-              <a:t>no </a:t>
-            </a:r>
-            <a:r>
-              <a:rPr lang="pt-BR" dirty="0" err="1">
-                <a:latin typeface="Altone Variable" pitchFamily="2" charset="0"/>
-              </a:rPr>
-              <a:t>frontend</a:t>
-            </a:r>
-            <a:r>
-              <a:rPr lang="pt-BR" dirty="0">
-                <a:latin typeface="Altone Variable" pitchFamily="2" charset="0"/>
-              </a:rPr>
-              <a:t>.</a:t>
-            </a:r>
-            <a:endParaRPr lang="pt-BR" dirty="0">
-              <a:latin typeface="Altone Variable" pitchFamily="2" charset="0"/>
-            </a:endParaRPr>
+              <a:t>api</a:t>
+            </a:r>
+            <a:r>
+              <a:rPr lang="pt-BR" dirty="0" smtClean="0">
+                <a:latin typeface="Altone Variable" pitchFamily="2" charset="0"/>
+              </a:rPr>
+              <a:t> retornar </a:t>
+            </a:r>
+            <a:r>
+              <a:rPr lang="pt-BR" dirty="0">
+                <a:latin typeface="Altone Variable" pitchFamily="2" charset="0"/>
+              </a:rPr>
+              <a:t>uma determinada informação. A comunicação entre essas partes do sistema</a:t>
+            </a:r>
+          </a:p>
+          <a:p>
+            <a:r>
+              <a:rPr lang="pt-BR" dirty="0">
+                <a:latin typeface="Altone Variable" pitchFamily="2" charset="0"/>
+              </a:rPr>
+              <a:t>pode ser feita a partir do </a:t>
+            </a:r>
+            <a:r>
+              <a:rPr lang="pt-BR" b="1" dirty="0">
+                <a:latin typeface="Altone Variable" pitchFamily="2" charset="0"/>
+              </a:rPr>
+              <a:t>método HTTP</a:t>
+            </a:r>
+            <a:r>
+              <a:rPr lang="pt-BR" dirty="0">
+                <a:latin typeface="Altone Variable" pitchFamily="2" charset="0"/>
+              </a:rPr>
+              <a:t>, que </a:t>
+            </a:r>
+            <a:r>
+              <a:rPr lang="pt-BR" dirty="0" smtClean="0">
+                <a:latin typeface="Altone Variable" pitchFamily="2" charset="0"/>
+              </a:rPr>
+              <a:t>é um </a:t>
+            </a:r>
+            <a:r>
+              <a:rPr lang="pt-BR" dirty="0">
+                <a:latin typeface="Altone Variable" pitchFamily="2" charset="0"/>
+              </a:rPr>
+              <a:t>protocolo de comunicação onde através </a:t>
+            </a:r>
+            <a:r>
+              <a:rPr lang="pt-BR" dirty="0" smtClean="0">
+                <a:latin typeface="Altone Variable" pitchFamily="2" charset="0"/>
+              </a:rPr>
+              <a:t>dele é </a:t>
+            </a:r>
+            <a:r>
+              <a:rPr lang="pt-BR" dirty="0">
+                <a:latin typeface="Altone Variable" pitchFamily="2" charset="0"/>
+              </a:rPr>
+              <a:t>possível a comunicação entre os </a:t>
+            </a:r>
+            <a:r>
+              <a:rPr lang="pt-BR" dirty="0" smtClean="0">
+                <a:latin typeface="Altone Variable" pitchFamily="2" charset="0"/>
+              </a:rPr>
+              <a:t>diferentes pontos </a:t>
+            </a:r>
+            <a:r>
+              <a:rPr lang="pt-BR" dirty="0">
+                <a:latin typeface="Altone Variable" pitchFamily="2" charset="0"/>
+              </a:rPr>
+              <a:t>de um sistema.</a:t>
+            </a:r>
           </a:p>
         </p:txBody>
       </p:sp>
     </p:spTree>
     <p:extLst>
       <p:ext uri="{BB962C8B-B14F-4D97-AF65-F5344CB8AC3E}">
-        <p14:creationId xmlns:p14="http://schemas.microsoft.com/office/powerpoint/2010/main" val="1885562912"/>
+        <p14:creationId xmlns:p14="http://schemas.microsoft.com/office/powerpoint/2010/main" val="1218642432"/>
       </p:ext>
     </p:extLst>
   </p:cSld>
@@ -7157,20 +7320,152 @@
           <a:p>
             <a:pPr algn="ctr"/>
             <a:r>
-              <a:rPr lang="pt-BR" dirty="0" smtClean="0">
+              <a:rPr lang="pt-BR" dirty="0">
                 <a:latin typeface="Altone Variable Semi Bold" pitchFamily="2" charset="0"/>
               </a:rPr>
-              <a:t>Instalando o </a:t>
-            </a:r>
-            <a:r>
-              <a:rPr lang="pt-BR" dirty="0" err="1" smtClean="0">
+              <a:t>Requisições à API</a:t>
+            </a:r>
+          </a:p>
+        </p:txBody>
+      </p:sp>
+      <p:sp>
+        <p:nvSpPr>
+          <p:cNvPr id="3" name="Espaço Reservado para Conteúdo 2"/>
+          <p:cNvSpPr>
+            <a:spLocks noGrp="1"/>
+          </p:cNvSpPr>
+          <p:nvPr>
+            <p:ph idx="1"/>
+          </p:nvPr>
+        </p:nvSpPr>
+        <p:spPr>
+          <a:xfrm>
+            <a:off x="838200" y="2210186"/>
+            <a:ext cx="10220058" cy="3301852"/>
+          </a:xfrm>
+        </p:spPr>
+        <p:txBody>
+          <a:bodyPr>
+            <a:normAutofit/>
+          </a:bodyPr>
+          <a:lstStyle/>
+          <a:p>
+            <a:r>
+              <a:rPr lang="pt-BR" dirty="0">
+                <a:latin typeface="Altone Variable" pitchFamily="2" charset="0"/>
+              </a:rPr>
+              <a:t>O protocolo HTTP possui métodos que são </a:t>
+            </a:r>
+            <a:r>
+              <a:rPr lang="pt-BR" dirty="0" smtClean="0">
+                <a:latin typeface="Altone Variable" pitchFamily="2" charset="0"/>
+              </a:rPr>
+              <a:t>utilizados para </a:t>
+            </a:r>
+            <a:r>
+              <a:rPr lang="pt-BR" dirty="0">
+                <a:latin typeface="Altone Variable" pitchFamily="2" charset="0"/>
+              </a:rPr>
+              <a:t>diferentes finalidades</a:t>
+            </a:r>
+            <a:r>
+              <a:rPr lang="pt-BR" dirty="0" smtClean="0">
+                <a:latin typeface="Altone Variable" pitchFamily="2" charset="0"/>
+              </a:rPr>
+              <a:t>.</a:t>
+            </a:r>
+          </a:p>
+          <a:p>
+            <a:endParaRPr lang="pt-BR" dirty="0">
+              <a:latin typeface="Altone Variable" pitchFamily="2" charset="0"/>
+            </a:endParaRPr>
+          </a:p>
+          <a:p>
+            <a:r>
+              <a:rPr lang="pt-BR" dirty="0">
+                <a:latin typeface="Altone Variable" pitchFamily="2" charset="0"/>
+              </a:rPr>
+              <a:t>Os principais que veremos são </a:t>
+            </a:r>
+            <a:r>
+              <a:rPr lang="pt-BR" b="1" dirty="0">
+                <a:latin typeface="Altone Variable" pitchFamily="2" charset="0"/>
+              </a:rPr>
+              <a:t>GET, POST, PUT </a:t>
+            </a:r>
+            <a:r>
+              <a:rPr lang="pt-BR" dirty="0" smtClean="0">
+                <a:latin typeface="Altone Variable" pitchFamily="2" charset="0"/>
+              </a:rPr>
+              <a:t>e</a:t>
+            </a:r>
+            <a:r>
+              <a:rPr lang="pt-BR" b="1" dirty="0" smtClean="0">
+                <a:latin typeface="Altone Variable" pitchFamily="2" charset="0"/>
+              </a:rPr>
+              <a:t> DELETE</a:t>
+            </a:r>
+            <a:r>
+              <a:rPr lang="pt-BR" dirty="0">
+                <a:latin typeface="Altone Variable" pitchFamily="2" charset="0"/>
+              </a:rPr>
+              <a:t>.</a:t>
+            </a:r>
+          </a:p>
+        </p:txBody>
+      </p:sp>
+    </p:spTree>
+    <p:extLst>
+      <p:ext uri="{BB962C8B-B14F-4D97-AF65-F5344CB8AC3E}">
+        <p14:creationId xmlns:p14="http://schemas.microsoft.com/office/powerpoint/2010/main" val="3768773745"/>
+      </p:ext>
+    </p:extLst>
+  </p:cSld>
+  <p:clrMapOvr>
+    <a:masterClrMapping/>
+  </p:clrMapOvr>
+</p:sld>
+</file>
+
+<file path=ppt/slides/slide31.xml><?xml version="1.0" encoding="utf-8"?>
+<p:sld xmlns:a="http://schemas.openxmlformats.org/drawingml/2006/main" xmlns:r="http://schemas.openxmlformats.org/officeDocument/2006/relationships" xmlns:p="http://schemas.openxmlformats.org/presentationml/2006/main">
+  <p:cSld>
+    <p:spTree>
+      <p:nvGrpSpPr>
+        <p:cNvPr id="1" name=""/>
+        <p:cNvGrpSpPr/>
+        <p:nvPr/>
+      </p:nvGrpSpPr>
+      <p:grpSpPr>
+        <a:xfrm>
+          <a:off x="0" y="0"/>
+          <a:ext cx="0" cy="0"/>
+          <a:chOff x="0" y="0"/>
+          <a:chExt cx="0" cy="0"/>
+        </a:xfrm>
+      </p:grpSpPr>
+      <p:sp>
+        <p:nvSpPr>
+          <p:cNvPr id="2" name="Título 1"/>
+          <p:cNvSpPr>
+            <a:spLocks noGrp="1"/>
+          </p:cNvSpPr>
+          <p:nvPr>
+            <p:ph type="title"/>
+          </p:nvPr>
+        </p:nvSpPr>
+        <p:spPr/>
+        <p:txBody>
+          <a:bodyPr/>
+          <a:lstStyle/>
+          <a:p>
+            <a:pPr algn="ctr"/>
+            <a:r>
+              <a:rPr lang="pt-BR" dirty="0">
                 <a:latin typeface="Altone Variable Semi Bold" pitchFamily="2" charset="0"/>
               </a:rPr>
-              <a:t>Router</a:t>
-            </a:r>
-            <a:endParaRPr lang="pt-BR" dirty="0">
-              <a:latin typeface="Altone Variable Semi Bold" pitchFamily="2" charset="0"/>
-            </a:endParaRPr>
+              <a:t>Requisições à API</a:t>
+            </a:r>
           </a:p>
         </p:txBody>
       </p:sp>
@@ -7197,177 +7492,171 @@
           <a:lstStyle/>
           <a:p>
             <a:r>
-              <a:rPr lang="pt-BR" b="1" dirty="0" err="1">
-                <a:latin typeface="Altone Variable" pitchFamily="2" charset="0"/>
-              </a:rPr>
-              <a:t>npm</a:t>
-            </a:r>
-            <a:r>
               <a:rPr lang="pt-BR" b="1" dirty="0">
+                <a:solidFill>
+                  <a:schemeClr val="accent1"/>
+                </a:solidFill>
+                <a:latin typeface="Altone Variable" pitchFamily="2" charset="0"/>
+              </a:rPr>
+              <a:t>GET</a:t>
+            </a:r>
+            <a:r>
+              <a:rPr lang="pt-BR" dirty="0">
+                <a:solidFill>
+                  <a:schemeClr val="accent1"/>
+                </a:solidFill>
                 <a:latin typeface="Altone Variable" pitchFamily="2" charset="0"/>
               </a:rPr>
               <a:t> </a:t>
             </a:r>
             <a:r>
-              <a:rPr lang="pt-BR" b="1" dirty="0" err="1">
-                <a:latin typeface="Altone Variable" pitchFamily="2" charset="0"/>
-              </a:rPr>
-              <a:t>install</a:t>
-            </a:r>
+              <a:rPr lang="pt-BR" dirty="0" smtClean="0">
+                <a:latin typeface="Altone Variable" pitchFamily="2" charset="0"/>
+              </a:rPr>
+              <a:t>tem </a:t>
+            </a:r>
+            <a:r>
+              <a:rPr lang="pt-BR" dirty="0">
+                <a:latin typeface="Altone Variable" pitchFamily="2" charset="0"/>
+              </a:rPr>
+              <a:t>a função de </a:t>
+            </a:r>
+            <a:r>
+              <a:rPr lang="pt-BR" dirty="0" smtClean="0">
+                <a:latin typeface="Altone Variable" pitchFamily="2" charset="0"/>
+              </a:rPr>
+              <a:t>pegar dados </a:t>
+            </a:r>
+            <a:r>
+              <a:rPr lang="pt-BR" dirty="0">
+                <a:latin typeface="Altone Variable" pitchFamily="2" charset="0"/>
+              </a:rPr>
+              <a:t>do </a:t>
+            </a:r>
+            <a:r>
+              <a:rPr lang="pt-BR" dirty="0" smtClean="0">
+                <a:latin typeface="Altone Variable" pitchFamily="2" charset="0"/>
+              </a:rPr>
+              <a:t>servidor.</a:t>
+            </a:r>
+          </a:p>
+          <a:p>
             <a:r>
               <a:rPr lang="pt-BR" b="1" dirty="0">
+                <a:solidFill>
+                  <a:schemeClr val="accent6"/>
+                </a:solidFill>
+                <a:latin typeface="Altone Variable" pitchFamily="2" charset="0"/>
+              </a:rPr>
+              <a:t>POST</a:t>
+            </a:r>
+            <a:r>
+              <a:rPr lang="pt-BR" dirty="0">
+                <a:latin typeface="Altone Variable" pitchFamily="2" charset="0"/>
+              </a:rPr>
+              <a:t> tem a função de </a:t>
+            </a:r>
+            <a:r>
+              <a:rPr lang="pt-BR" dirty="0" smtClean="0">
+                <a:latin typeface="Altone Variable" pitchFamily="2" charset="0"/>
+              </a:rPr>
+              <a:t>transmitir dados </a:t>
+            </a:r>
+            <a:r>
+              <a:rPr lang="pt-BR" dirty="0">
+                <a:latin typeface="Altone Variable" pitchFamily="2" charset="0"/>
+              </a:rPr>
+              <a:t>para o servidor</a:t>
+            </a:r>
+            <a:r>
+              <a:rPr lang="pt-BR" dirty="0" smtClean="0">
+                <a:latin typeface="Altone Variable" pitchFamily="2" charset="0"/>
+              </a:rPr>
+              <a:t>.</a:t>
+            </a:r>
+          </a:p>
+          <a:p>
+            <a:r>
+              <a:rPr lang="pt-BR" b="1" dirty="0">
+                <a:solidFill>
+                  <a:schemeClr val="accent2"/>
+                </a:solidFill>
+                <a:latin typeface="Altone Variable" pitchFamily="2" charset="0"/>
+              </a:rPr>
+              <a:t>PUT</a:t>
+            </a:r>
+            <a:r>
+              <a:rPr lang="pt-BR" dirty="0">
+                <a:solidFill>
+                  <a:schemeClr val="accent2"/>
+                </a:solidFill>
                 <a:latin typeface="Altone Variable" pitchFamily="2" charset="0"/>
               </a:rPr>
               <a:t> </a:t>
             </a:r>
             <a:r>
-              <a:rPr lang="pt-BR" b="1" dirty="0" smtClean="0">
-                <a:latin typeface="Altone Variable" pitchFamily="2" charset="0"/>
-                <a:hlinkClick r:id="rId2"/>
-              </a:rPr>
-              <a:t>react-router-dom@5.2.0</a:t>
-            </a:r>
-            <a:endParaRPr lang="pt-BR" b="1" dirty="0" smtClean="0">
-              <a:latin typeface="Altone Variable" pitchFamily="2" charset="0"/>
-            </a:endParaRPr>
-          </a:p>
-          <a:p>
-            <a:endParaRPr lang="pt-BR" b="1" dirty="0">
-              <a:latin typeface="Altone Variable" pitchFamily="2" charset="0"/>
-            </a:endParaRPr>
-          </a:p>
-          <a:p>
-            <a:r>
-              <a:rPr lang="pt-BR" dirty="0" smtClean="0">
-                <a:latin typeface="Altone Variable" pitchFamily="2" charset="0"/>
-              </a:rPr>
-              <a:t>incluir </a:t>
-            </a:r>
-            <a:r>
-              <a:rPr lang="pt-BR" dirty="0">
-                <a:latin typeface="Altone Variable" pitchFamily="2" charset="0"/>
-              </a:rPr>
-              <a:t>no </a:t>
-            </a:r>
-            <a:r>
-              <a:rPr lang="pt-BR" dirty="0" err="1">
-                <a:latin typeface="Altone Variable" pitchFamily="2" charset="0"/>
-              </a:rPr>
-              <a:t>main.jsx</a:t>
-            </a:r>
-            <a:r>
-              <a:rPr lang="pt-BR" dirty="0">
-                <a:latin typeface="Altone Variable" pitchFamily="2" charset="0"/>
-              </a:rPr>
-              <a:t> </a:t>
-            </a:r>
-            <a:r>
-              <a:rPr lang="pt-BR" dirty="0" smtClean="0">
-                <a:latin typeface="Altone Variable" pitchFamily="2" charset="0"/>
-              </a:rPr>
-              <a:t>o container </a:t>
-            </a:r>
-            <a:r>
-              <a:rPr lang="pt-BR" dirty="0">
-                <a:latin typeface="Altone Variable" pitchFamily="2" charset="0"/>
-              </a:rPr>
-              <a:t>para as páginas. Esse </a:t>
-            </a:r>
-            <a:r>
-              <a:rPr lang="pt-BR" dirty="0" smtClean="0">
-                <a:latin typeface="Altone Variable" pitchFamily="2" charset="0"/>
-              </a:rPr>
-              <a:t>container será </a:t>
-            </a:r>
-            <a:r>
-              <a:rPr lang="pt-BR" dirty="0">
-                <a:latin typeface="Altone Variable" pitchFamily="2" charset="0"/>
-              </a:rPr>
-              <a:t>criado com o </a:t>
-            </a:r>
-            <a:r>
-              <a:rPr lang="pt-BR" dirty="0" smtClean="0">
-                <a:latin typeface="Altone Variable" pitchFamily="2" charset="0"/>
-              </a:rPr>
-              <a:t>componente </a:t>
-            </a:r>
-            <a:r>
-              <a:rPr lang="pt-BR" b="1" dirty="0" smtClean="0">
-                <a:latin typeface="Altone Variable" pitchFamily="2" charset="0"/>
-              </a:rPr>
-              <a:t>&lt;</a:t>
-            </a:r>
-            <a:r>
-              <a:rPr lang="pt-BR" b="1" dirty="0" err="1" smtClean="0">
-                <a:latin typeface="Altone Variable" pitchFamily="2" charset="0"/>
-              </a:rPr>
-              <a:t>BrowserRouter</a:t>
-            </a:r>
-            <a:r>
-              <a:rPr lang="pt-BR" b="1" dirty="0" smtClean="0">
-                <a:latin typeface="Altone Variable" pitchFamily="2" charset="0"/>
-              </a:rPr>
-              <a:t> /&gt;.</a:t>
-            </a:r>
-          </a:p>
-          <a:p>
-            <a:endParaRPr lang="pt-BR" b="1" dirty="0">
-              <a:latin typeface="Altone Variable" pitchFamily="2" charset="0"/>
-            </a:endParaRPr>
-          </a:p>
-          <a:p>
-            <a:r>
-              <a:rPr lang="pt-BR" dirty="0">
-                <a:latin typeface="Altone Variable" pitchFamily="2" charset="0"/>
-              </a:rPr>
-              <a:t>Precisamos de um roteador, o "de/para" </a:t>
-            </a:r>
-            <a:r>
-              <a:rPr lang="pt-BR" dirty="0" smtClean="0">
-                <a:latin typeface="Altone Variable" pitchFamily="2" charset="0"/>
-              </a:rPr>
-              <a:t>entre o </a:t>
-            </a:r>
-            <a:r>
-              <a:rPr lang="pt-BR" dirty="0">
-                <a:latin typeface="Altone Variable" pitchFamily="2" charset="0"/>
-              </a:rPr>
-              <a:t>caminho e a </a:t>
-            </a:r>
-            <a:r>
-              <a:rPr lang="pt-BR" dirty="0" smtClean="0">
-                <a:latin typeface="Altone Variable" pitchFamily="2" charset="0"/>
-              </a:rPr>
-              <a:t>página. Componente </a:t>
-            </a:r>
-            <a:r>
-              <a:rPr lang="pt-BR" dirty="0">
-                <a:latin typeface="Altone Variable" pitchFamily="2" charset="0"/>
-              </a:rPr>
-              <a:t>`&lt;</a:t>
-            </a:r>
-            <a:r>
-              <a:rPr lang="pt-BR" dirty="0" err="1">
-                <a:latin typeface="Altone Variable" pitchFamily="2" charset="0"/>
-              </a:rPr>
-              <a:t>Route</a:t>
-            </a:r>
-            <a:r>
-              <a:rPr lang="pt-BR" dirty="0">
-                <a:latin typeface="Altone Variable" pitchFamily="2" charset="0"/>
-              </a:rPr>
-              <a:t> /&gt;`.</a:t>
+              <a:rPr lang="pt-BR" dirty="0">
+                <a:latin typeface="Altone Variable" pitchFamily="2" charset="0"/>
+              </a:rPr>
+              <a:t>tem a função de substituir </a:t>
+            </a:r>
+            <a:r>
+              <a:rPr lang="pt-BR" dirty="0" smtClean="0">
+                <a:latin typeface="Altone Variable" pitchFamily="2" charset="0"/>
+              </a:rPr>
+              <a:t>os dados </a:t>
+            </a:r>
+            <a:r>
+              <a:rPr lang="pt-BR" dirty="0">
+                <a:latin typeface="Altone Variable" pitchFamily="2" charset="0"/>
+              </a:rPr>
+              <a:t>do servidor</a:t>
+            </a:r>
+            <a:r>
+              <a:rPr lang="pt-BR" dirty="0" smtClean="0">
+                <a:latin typeface="Altone Variable" pitchFamily="2" charset="0"/>
+              </a:rPr>
+              <a:t>.</a:t>
             </a:r>
             <a:endParaRPr lang="pt-BR" dirty="0">
               <a:latin typeface="Altone Variable" pitchFamily="2" charset="0"/>
             </a:endParaRPr>
           </a:p>
+          <a:p>
+            <a:r>
+              <a:rPr lang="pt-BR" b="1" dirty="0">
+                <a:solidFill>
+                  <a:srgbClr val="FF0000"/>
+                </a:solidFill>
+                <a:latin typeface="Altone Variable" pitchFamily="2" charset="0"/>
+              </a:rPr>
+              <a:t>DELETE</a:t>
+            </a:r>
+            <a:r>
+              <a:rPr lang="pt-BR" dirty="0">
+                <a:latin typeface="Altone Variable" pitchFamily="2" charset="0"/>
+              </a:rPr>
+              <a:t> tem a função de apagar dados </a:t>
+            </a:r>
+            <a:r>
+              <a:rPr lang="pt-BR" dirty="0" smtClean="0">
+                <a:latin typeface="Altone Variable" pitchFamily="2" charset="0"/>
+              </a:rPr>
+              <a:t>do servidor</a:t>
+            </a:r>
+            <a:r>
+              <a:rPr lang="pt-BR" dirty="0">
+                <a:latin typeface="Altone Variable" pitchFamily="2" charset="0"/>
+              </a:rPr>
+              <a:t>.</a:t>
+            </a:r>
+          </a:p>
         </p:txBody>
       </p:sp>
     </p:spTree>
     <p:extLst>
       <p:ext uri="{BB962C8B-B14F-4D97-AF65-F5344CB8AC3E}">
-        <p14:creationId xmlns:p14="http://schemas.microsoft.com/office/powerpoint/2010/main" val="1470794827"/>
+        <p14:creationId xmlns:p14="http://schemas.microsoft.com/office/powerpoint/2010/main" val="2456015423"/>
       </p:ext>
     </p:extLst>
   </p:cSld>
@@ -7724,7 +8013,7 @@
               <a:rPr lang="pt-BR" dirty="0" smtClean="0">
                 <a:latin typeface="Altone Variable" pitchFamily="2" charset="0"/>
               </a:rPr>
-              <a:t>Selecionar o framework </a:t>
+              <a:t>Selecionar o </a:t>
             </a:r>
             <a:r>
               <a:rPr lang="pt-BR" b="1" dirty="0" err="1" smtClean="0">

</xml_diff>